<commit_message>
versione finale della tesina
</commit_message>
<xml_diff>
--- a/presentazione/Tesina Elvis.pptx
+++ b/presentazione/Tesina Elvis.pptx
@@ -5,7 +5,7 @@
     <p:sldMasterId id="2147483710" r:id="rId1"/>
   </p:sldMasterIdLst>
   <p:notesMasterIdLst>
-    <p:notesMasterId r:id="rId34"/>
+    <p:notesMasterId r:id="rId38"/>
   </p:notesMasterIdLst>
   <p:sldIdLst>
     <p:sldId id="256" r:id="rId2"/>
@@ -29,17 +29,21 @@
     <p:sldId id="272" r:id="rId20"/>
     <p:sldId id="275" r:id="rId21"/>
     <p:sldId id="276" r:id="rId22"/>
-    <p:sldId id="273" r:id="rId23"/>
-    <p:sldId id="281" r:id="rId24"/>
-    <p:sldId id="286" r:id="rId25"/>
-    <p:sldId id="287" r:id="rId26"/>
-    <p:sldId id="288" r:id="rId27"/>
-    <p:sldId id="289" r:id="rId28"/>
-    <p:sldId id="290" r:id="rId29"/>
-    <p:sldId id="292" r:id="rId30"/>
-    <p:sldId id="291" r:id="rId31"/>
-    <p:sldId id="293" r:id="rId32"/>
-    <p:sldId id="294" r:id="rId33"/>
+    <p:sldId id="295" r:id="rId23"/>
+    <p:sldId id="273" r:id="rId24"/>
+    <p:sldId id="281" r:id="rId25"/>
+    <p:sldId id="286" r:id="rId26"/>
+    <p:sldId id="287" r:id="rId27"/>
+    <p:sldId id="288" r:id="rId28"/>
+    <p:sldId id="289" r:id="rId29"/>
+    <p:sldId id="290" r:id="rId30"/>
+    <p:sldId id="292" r:id="rId31"/>
+    <p:sldId id="297" r:id="rId32"/>
+    <p:sldId id="296" r:id="rId33"/>
+    <p:sldId id="291" r:id="rId34"/>
+    <p:sldId id="293" r:id="rId35"/>
+    <p:sldId id="294" r:id="rId36"/>
+    <p:sldId id="298" r:id="rId37"/>
   </p:sldIdLst>
   <p:sldSz cx="12192000" cy="6858000"/>
   <p:notesSz cx="7559675" cy="10691813"/>
@@ -11515,6 +11519,242 @@
           <a:p>
             <a:pPr algn="ctr"/>
             <a:r>
+              <a:rPr lang="it-IT" spc="-1" dirty="0" err="1">
+                <a:uFill>
+                  <a:solidFill>
+                    <a:srgbClr val="FFFFFF"/>
+                  </a:solidFill>
+                </a:uFill>
+                <a:latin typeface="Arial Rounded MT Bold" panose="020F0704030504030204" pitchFamily="34" charset="0"/>
+              </a:rPr>
+              <a:t>MaRcatore</a:t>
+            </a:r>
+            <a:endParaRPr lang="en-GB" dirty="0">
+              <a:latin typeface="Arial Rounded MT Bold" panose="020F0704030504030204" pitchFamily="34" charset="0"/>
+            </a:endParaRPr>
+          </a:p>
+        </p:txBody>
+      </p:sp>
+      <p:sp>
+        <p:nvSpPr>
+          <p:cNvPr id="8" name="Segnaposto testo 7">
+            <a:extLst>
+              <a:ext uri="{FF2B5EF4-FFF2-40B4-BE49-F238E27FC236}">
+                <a16:creationId xmlns:a16="http://schemas.microsoft.com/office/drawing/2014/main" id="{1DE4F4F2-B148-48F9-A3B2-A119636CB3EC}"/>
+              </a:ext>
+            </a:extLst>
+          </p:cNvPr>
+          <p:cNvSpPr>
+            <a:spLocks noGrp="1"/>
+          </p:cNvSpPr>
+          <p:nvPr>
+            <p:ph idx="1"/>
+          </p:nvPr>
+        </p:nvSpPr>
+        <p:spPr>
+          <a:xfrm>
+            <a:off x="609480" y="1727999"/>
+            <a:ext cx="10972080" cy="4990853"/>
+          </a:xfrm>
+        </p:spPr>
+        <p:txBody>
+          <a:bodyPr anchor="t">
+            <a:noAutofit/>
+          </a:bodyPr>
+          <a:lstStyle/>
+          <a:p>
+            <a:pPr marL="0" indent="0">
+              <a:spcBef>
+                <a:spcPts val="1200"/>
+              </a:spcBef>
+              <a:buNone/>
+            </a:pPr>
+            <a:r>
+              <a:rPr lang="it-IT" sz="2200" dirty="0">
+                <a:solidFill>
+                  <a:schemeClr val="bg1"/>
+                </a:solidFill>
+                <a:latin typeface="Arial Rounded MT Bold" panose="020F0704030504030204" pitchFamily="34" charset="0"/>
+              </a:rPr>
+              <a:t>Una volta individuati tutti i punti di contorno dell’immagine devo filtrare i punti considerando soltanto quelli che approssimati ad un poligono hanno 4 lati.</a:t>
+            </a:r>
+          </a:p>
+          <a:p>
+            <a:pPr marL="0" indent="0">
+              <a:spcBef>
+                <a:spcPts val="1200"/>
+              </a:spcBef>
+              <a:buNone/>
+            </a:pPr>
+            <a:r>
+              <a:rPr lang="it-IT" sz="2200" dirty="0">
+                <a:solidFill>
+                  <a:schemeClr val="bg1"/>
+                </a:solidFill>
+                <a:latin typeface="Arial Rounded MT Bold" panose="020F0704030504030204" pitchFamily="34" charset="0"/>
+              </a:rPr>
+              <a:t>A questo punto prima di analizzare il marker devo fare in modo che esso sia rettangolare devo quindi «</a:t>
+            </a:r>
+            <a:r>
+              <a:rPr lang="it-IT" sz="2200" dirty="0" err="1">
+                <a:solidFill>
+                  <a:schemeClr val="bg1"/>
+                </a:solidFill>
+                <a:latin typeface="Arial Rounded MT Bold" panose="020F0704030504030204" pitchFamily="34" charset="0"/>
+              </a:rPr>
+              <a:t>wrappare</a:t>
+            </a:r>
+            <a:r>
+              <a:rPr lang="it-IT" sz="2200" dirty="0">
+                <a:solidFill>
+                  <a:schemeClr val="bg1"/>
+                </a:solidFill>
+                <a:latin typeface="Arial Rounded MT Bold" panose="020F0704030504030204" pitchFamily="34" charset="0"/>
+              </a:rPr>
+              <a:t>» l’immagine.</a:t>
+            </a:r>
+          </a:p>
+          <a:p>
+            <a:pPr marL="0" indent="0">
+              <a:spcBef>
+                <a:spcPts val="1200"/>
+              </a:spcBef>
+              <a:buNone/>
+            </a:pPr>
+            <a:r>
+              <a:rPr lang="it-IT" sz="2200" dirty="0">
+                <a:solidFill>
+                  <a:schemeClr val="bg1"/>
+                </a:solidFill>
+                <a:latin typeface="Arial Rounded MT Bold" panose="020F0704030504030204" pitchFamily="34" charset="0"/>
+              </a:rPr>
+              <a:t>È tutto pronto per analizzare il marker: si verifica quindi che:</a:t>
+            </a:r>
+          </a:p>
+          <a:p>
+            <a:pPr>
+              <a:spcBef>
+                <a:spcPts val="1200"/>
+              </a:spcBef>
+            </a:pPr>
+            <a:r>
+              <a:rPr lang="it-IT" sz="2200" dirty="0">
+                <a:solidFill>
+                  <a:schemeClr val="bg1"/>
+                </a:solidFill>
+                <a:latin typeface="Arial Rounded MT Bold" panose="020F0704030504030204" pitchFamily="34" charset="0"/>
+              </a:rPr>
+              <a:t>Il contorno sia completamente nero,</a:t>
+            </a:r>
+          </a:p>
+          <a:p>
+            <a:pPr>
+              <a:spcBef>
+                <a:spcPts val="1200"/>
+              </a:spcBef>
+            </a:pPr>
+            <a:r>
+              <a:rPr lang="it-IT" sz="2200" dirty="0">
+                <a:solidFill>
+                  <a:schemeClr val="bg1"/>
+                </a:solidFill>
+                <a:latin typeface="Arial Rounded MT Bold" panose="020F0704030504030204" pitchFamily="34" charset="0"/>
+              </a:rPr>
+              <a:t>lo strato di orientamento abbia esattamente tre triangoli bianchi, si ruota quindi di conseguenza l’immagine,</a:t>
+            </a:r>
+          </a:p>
+          <a:p>
+            <a:pPr>
+              <a:spcBef>
+                <a:spcPts val="1200"/>
+              </a:spcBef>
+            </a:pPr>
+            <a:r>
+              <a:rPr lang="it-IT" sz="2200" dirty="0">
+                <a:solidFill>
+                  <a:schemeClr val="bg1"/>
+                </a:solidFill>
+                <a:latin typeface="Arial Rounded MT Bold" panose="020F0704030504030204" pitchFamily="34" charset="0"/>
+              </a:rPr>
+              <a:t>si leggono i dati e si calcola il CRC16</a:t>
+            </a:r>
+          </a:p>
+          <a:p>
+            <a:pPr>
+              <a:spcBef>
+                <a:spcPts val="1200"/>
+              </a:spcBef>
+            </a:pPr>
+            <a:r>
+              <a:rPr lang="it-IT" sz="2200" dirty="0">
+                <a:solidFill>
+                  <a:schemeClr val="bg1"/>
+                </a:solidFill>
+                <a:latin typeface="Arial Rounded MT Bold" panose="020F0704030504030204" pitchFamily="34" charset="0"/>
+              </a:rPr>
+              <a:t>si legge i dati del CRC e si verifica che sia lo stesso valore calcolato.</a:t>
+            </a:r>
+          </a:p>
+        </p:txBody>
+      </p:sp>
+    </p:spTree>
+    <p:extLst>
+      <p:ext uri="{BB962C8B-B14F-4D97-AF65-F5344CB8AC3E}">
+        <p14:creationId xmlns:p14="http://schemas.microsoft.com/office/powerpoint/2010/main" val="2538889069"/>
+      </p:ext>
+    </p:extLst>
+  </p:cSld>
+  <p:clrMapOvr>
+    <a:masterClrMapping/>
+  </p:clrMapOvr>
+</p:sld>
+</file>
+
+<file path=ppt/slides/slide23.xml><?xml version="1.0" encoding="utf-8"?>
+<p:sld xmlns:a="http://schemas.openxmlformats.org/drawingml/2006/main" xmlns:r="http://schemas.openxmlformats.org/officeDocument/2006/relationships" xmlns:p="http://schemas.openxmlformats.org/presentationml/2006/main">
+  <p:cSld>
+    <p:spTree>
+      <p:nvGrpSpPr>
+        <p:cNvPr id="1" name=""/>
+        <p:cNvGrpSpPr/>
+        <p:nvPr/>
+      </p:nvGrpSpPr>
+      <p:grpSpPr>
+        <a:xfrm>
+          <a:off x="0" y="0"/>
+          <a:ext cx="0" cy="0"/>
+          <a:chOff x="0" y="0"/>
+          <a:chExt cx="0" cy="0"/>
+        </a:xfrm>
+      </p:grpSpPr>
+      <p:sp>
+        <p:nvSpPr>
+          <p:cNvPr id="7" name="Titolo 6">
+            <a:extLst>
+              <a:ext uri="{FF2B5EF4-FFF2-40B4-BE49-F238E27FC236}">
+                <a16:creationId xmlns:a16="http://schemas.microsoft.com/office/drawing/2014/main" id="{C16E6962-1B7B-4389-81F2-F4D60E008C63}"/>
+              </a:ext>
+            </a:extLst>
+          </p:cNvPr>
+          <p:cNvSpPr>
+            <a:spLocks noGrp="1"/>
+          </p:cNvSpPr>
+          <p:nvPr>
+            <p:ph type="title"/>
+          </p:nvPr>
+        </p:nvSpPr>
+        <p:spPr>
+          <a:xfrm>
+            <a:off x="1876320" y="0"/>
+            <a:ext cx="8790840" cy="2386800"/>
+          </a:xfrm>
+        </p:spPr>
+        <p:txBody>
+          <a:bodyPr/>
+          <a:lstStyle/>
+          <a:p>
+            <a:pPr algn="ctr"/>
+            <a:r>
               <a:rPr lang="it-IT" spc="-1" dirty="0">
                 <a:uFill>
                   <a:solidFill>
@@ -12117,7 +12357,7 @@
 </p:sld>
 </file>
 
-<file path=ppt/slides/slide23.xml><?xml version="1.0" encoding="utf-8"?>
+<file path=ppt/slides/slide24.xml><?xml version="1.0" encoding="utf-8"?>
 <p:sld xmlns:a="http://schemas.openxmlformats.org/drawingml/2006/main" xmlns:r="http://schemas.openxmlformats.org/officeDocument/2006/relationships" xmlns:p="http://schemas.openxmlformats.org/presentationml/2006/main">
   <p:cSld>
     <p:spTree>
@@ -12236,7 +12476,7 @@
             </a:r>
           </a:p>
           <a:p>
-            <a:endParaRPr lang="it-IT" sz="2200" dirty="0">
+            <a:endParaRPr lang="it-IT" sz="2200" u="sng" dirty="0">
               <a:solidFill>
                 <a:schemeClr val="bg1"/>
               </a:solidFill>
@@ -12245,193 +12485,320 @@
           </a:p>
           <a:p>
             <a:r>
-              <a:rPr lang="it-IT" dirty="0" err="1"/>
+              <a:rPr lang="it-IT" b="1" dirty="0" err="1">
+                <a:latin typeface="Courier New" panose="02070309020205020404" pitchFamily="49" charset="0"/>
+                <a:cs typeface="Courier New" panose="02070309020205020404" pitchFamily="49" charset="0"/>
+              </a:rPr>
               <a:t>void</a:t>
             </a:r>
             <a:r>
-              <a:rPr lang="it-IT" dirty="0"/>
+              <a:rPr lang="it-IT" b="1" dirty="0">
+                <a:latin typeface="Courier New" panose="02070309020205020404" pitchFamily="49" charset="0"/>
+                <a:cs typeface="Courier New" panose="02070309020205020404" pitchFamily="49" charset="0"/>
+              </a:rPr>
               <a:t> </a:t>
             </a:r>
             <a:r>
-              <a:rPr lang="it-IT" dirty="0" err="1"/>
+              <a:rPr lang="it-IT" b="1" dirty="0" err="1">
+                <a:latin typeface="Courier New" panose="02070309020205020404" pitchFamily="49" charset="0"/>
+                <a:cs typeface="Courier New" panose="02070309020205020404" pitchFamily="49" charset="0"/>
+              </a:rPr>
               <a:t>solvePnP</a:t>
             </a:r>
             <a:r>
-              <a:rPr lang="it-IT" dirty="0"/>
+              <a:rPr lang="it-IT" b="1" dirty="0">
+                <a:latin typeface="Courier New" panose="02070309020205020404" pitchFamily="49" charset="0"/>
+                <a:cs typeface="Courier New" panose="02070309020205020404" pitchFamily="49" charset="0"/>
+              </a:rPr>
               <a:t>(</a:t>
             </a:r>
           </a:p>
           <a:p>
             <a:r>
-              <a:rPr lang="it-IT" dirty="0"/>
+              <a:rPr lang="it-IT" b="1" dirty="0">
+                <a:latin typeface="Courier New" panose="02070309020205020404" pitchFamily="49" charset="0"/>
+                <a:cs typeface="Courier New" panose="02070309020205020404" pitchFamily="49" charset="0"/>
+              </a:rPr>
               <a:t>	</a:t>
             </a:r>
             <a:r>
-              <a:rPr lang="it-IT" dirty="0" err="1"/>
+              <a:rPr lang="it-IT" b="1" dirty="0" err="1">
+                <a:latin typeface="Courier New" panose="02070309020205020404" pitchFamily="49" charset="0"/>
+                <a:cs typeface="Courier New" panose="02070309020205020404" pitchFamily="49" charset="0"/>
+              </a:rPr>
               <a:t>const</a:t>
             </a:r>
             <a:r>
-              <a:rPr lang="it-IT" dirty="0"/>
+              <a:rPr lang="it-IT" b="1" dirty="0">
+                <a:latin typeface="Courier New" panose="02070309020205020404" pitchFamily="49" charset="0"/>
+                <a:cs typeface="Courier New" panose="02070309020205020404" pitchFamily="49" charset="0"/>
+              </a:rPr>
               <a:t> </a:t>
             </a:r>
             <a:r>
-              <a:rPr lang="it-IT" dirty="0" err="1"/>
+              <a:rPr lang="it-IT" b="1" dirty="0" err="1">
+                <a:latin typeface="Courier New" panose="02070309020205020404" pitchFamily="49" charset="0"/>
+                <a:cs typeface="Courier New" panose="02070309020205020404" pitchFamily="49" charset="0"/>
+              </a:rPr>
               <a:t>Mat</a:t>
             </a:r>
             <a:r>
-              <a:rPr lang="it-IT" dirty="0"/>
+              <a:rPr lang="it-IT" b="1" dirty="0">
+                <a:latin typeface="Courier New" panose="02070309020205020404" pitchFamily="49" charset="0"/>
+                <a:cs typeface="Courier New" panose="02070309020205020404" pitchFamily="49" charset="0"/>
+              </a:rPr>
               <a:t>&amp; </a:t>
             </a:r>
             <a:r>
-              <a:rPr lang="it-IT" dirty="0" err="1"/>
+              <a:rPr lang="it-IT" b="1" dirty="0" err="1">
+                <a:latin typeface="Courier New" panose="02070309020205020404" pitchFamily="49" charset="0"/>
+                <a:cs typeface="Courier New" panose="02070309020205020404" pitchFamily="49" charset="0"/>
+              </a:rPr>
               <a:t>objectPoints</a:t>
             </a:r>
             <a:r>
-              <a:rPr lang="it-IT" dirty="0"/>
+              <a:rPr lang="it-IT" b="1" dirty="0">
+                <a:latin typeface="Courier New" panose="02070309020205020404" pitchFamily="49" charset="0"/>
+                <a:cs typeface="Courier New" panose="02070309020205020404" pitchFamily="49" charset="0"/>
+              </a:rPr>
               <a:t>,</a:t>
             </a:r>
           </a:p>
           <a:p>
             <a:r>
-              <a:rPr lang="it-IT" dirty="0"/>
+              <a:rPr lang="it-IT" b="1" dirty="0">
+                <a:latin typeface="Courier New" panose="02070309020205020404" pitchFamily="49" charset="0"/>
+                <a:cs typeface="Courier New" panose="02070309020205020404" pitchFamily="49" charset="0"/>
+              </a:rPr>
               <a:t>	</a:t>
             </a:r>
             <a:r>
-              <a:rPr lang="it-IT" dirty="0" err="1"/>
+              <a:rPr lang="it-IT" b="1" dirty="0" err="1">
+                <a:latin typeface="Courier New" panose="02070309020205020404" pitchFamily="49" charset="0"/>
+                <a:cs typeface="Courier New" panose="02070309020205020404" pitchFamily="49" charset="0"/>
+              </a:rPr>
               <a:t>const</a:t>
             </a:r>
             <a:r>
-              <a:rPr lang="it-IT" dirty="0"/>
+              <a:rPr lang="it-IT" b="1" dirty="0">
+                <a:latin typeface="Courier New" panose="02070309020205020404" pitchFamily="49" charset="0"/>
+                <a:cs typeface="Courier New" panose="02070309020205020404" pitchFamily="49" charset="0"/>
+              </a:rPr>
               <a:t> </a:t>
             </a:r>
             <a:r>
-              <a:rPr lang="it-IT" dirty="0" err="1"/>
+              <a:rPr lang="it-IT" b="1" dirty="0" err="1">
+                <a:latin typeface="Courier New" panose="02070309020205020404" pitchFamily="49" charset="0"/>
+                <a:cs typeface="Courier New" panose="02070309020205020404" pitchFamily="49" charset="0"/>
+              </a:rPr>
               <a:t>Mat</a:t>
             </a:r>
             <a:r>
-              <a:rPr lang="it-IT" dirty="0"/>
+              <a:rPr lang="it-IT" b="1" dirty="0">
+                <a:latin typeface="Courier New" panose="02070309020205020404" pitchFamily="49" charset="0"/>
+                <a:cs typeface="Courier New" panose="02070309020205020404" pitchFamily="49" charset="0"/>
+              </a:rPr>
               <a:t>&amp; </a:t>
             </a:r>
             <a:r>
-              <a:rPr lang="it-IT" dirty="0" err="1"/>
+              <a:rPr lang="it-IT" b="1" dirty="0" err="1">
+                <a:latin typeface="Courier New" panose="02070309020205020404" pitchFamily="49" charset="0"/>
+                <a:cs typeface="Courier New" panose="02070309020205020404" pitchFamily="49" charset="0"/>
+              </a:rPr>
               <a:t>imagePoints</a:t>
             </a:r>
             <a:r>
-              <a:rPr lang="it-IT" dirty="0"/>
+              <a:rPr lang="it-IT" b="1" dirty="0">
+                <a:latin typeface="Courier New" panose="02070309020205020404" pitchFamily="49" charset="0"/>
+                <a:cs typeface="Courier New" panose="02070309020205020404" pitchFamily="49" charset="0"/>
+              </a:rPr>
               <a:t>,</a:t>
             </a:r>
           </a:p>
           <a:p>
             <a:r>
-              <a:rPr lang="it-IT" dirty="0"/>
+              <a:rPr lang="it-IT" b="1" dirty="0">
+                <a:latin typeface="Courier New" panose="02070309020205020404" pitchFamily="49" charset="0"/>
+                <a:cs typeface="Courier New" panose="02070309020205020404" pitchFamily="49" charset="0"/>
+              </a:rPr>
               <a:t>	</a:t>
             </a:r>
             <a:r>
-              <a:rPr lang="it-IT" dirty="0" err="1"/>
+              <a:rPr lang="it-IT" b="1" dirty="0" err="1">
+                <a:latin typeface="Courier New" panose="02070309020205020404" pitchFamily="49" charset="0"/>
+                <a:cs typeface="Courier New" panose="02070309020205020404" pitchFamily="49" charset="0"/>
+              </a:rPr>
               <a:t>const</a:t>
             </a:r>
             <a:r>
-              <a:rPr lang="it-IT" dirty="0"/>
+              <a:rPr lang="it-IT" b="1" dirty="0">
+                <a:latin typeface="Courier New" panose="02070309020205020404" pitchFamily="49" charset="0"/>
+                <a:cs typeface="Courier New" panose="02070309020205020404" pitchFamily="49" charset="0"/>
+              </a:rPr>
               <a:t> </a:t>
             </a:r>
             <a:r>
-              <a:rPr lang="it-IT" dirty="0" err="1"/>
+              <a:rPr lang="it-IT" b="1" dirty="0" err="1">
+                <a:latin typeface="Courier New" panose="02070309020205020404" pitchFamily="49" charset="0"/>
+                <a:cs typeface="Courier New" panose="02070309020205020404" pitchFamily="49" charset="0"/>
+              </a:rPr>
               <a:t>Mat</a:t>
             </a:r>
             <a:r>
-              <a:rPr lang="it-IT" dirty="0"/>
+              <a:rPr lang="it-IT" b="1" dirty="0">
+                <a:latin typeface="Courier New" panose="02070309020205020404" pitchFamily="49" charset="0"/>
+                <a:cs typeface="Courier New" panose="02070309020205020404" pitchFamily="49" charset="0"/>
+              </a:rPr>
               <a:t>&amp; </a:t>
             </a:r>
             <a:r>
-              <a:rPr lang="it-IT" dirty="0" err="1"/>
+              <a:rPr lang="it-IT" b="1" dirty="0" err="1">
+                <a:latin typeface="Courier New" panose="02070309020205020404" pitchFamily="49" charset="0"/>
+                <a:cs typeface="Courier New" panose="02070309020205020404" pitchFamily="49" charset="0"/>
+              </a:rPr>
               <a:t>cameraMatrix</a:t>
             </a:r>
             <a:r>
-              <a:rPr lang="it-IT" dirty="0"/>
+              <a:rPr lang="it-IT" b="1" dirty="0">
+                <a:latin typeface="Courier New" panose="02070309020205020404" pitchFamily="49" charset="0"/>
+                <a:cs typeface="Courier New" panose="02070309020205020404" pitchFamily="49" charset="0"/>
+              </a:rPr>
               <a:t>,</a:t>
             </a:r>
           </a:p>
           <a:p>
             <a:r>
-              <a:rPr lang="it-IT" dirty="0"/>
+              <a:rPr lang="it-IT" b="1" dirty="0">
+                <a:latin typeface="Courier New" panose="02070309020205020404" pitchFamily="49" charset="0"/>
+                <a:cs typeface="Courier New" panose="02070309020205020404" pitchFamily="49" charset="0"/>
+              </a:rPr>
               <a:t>	</a:t>
             </a:r>
             <a:r>
-              <a:rPr lang="it-IT" dirty="0" err="1"/>
+              <a:rPr lang="it-IT" b="1" dirty="0" err="1">
+                <a:latin typeface="Courier New" panose="02070309020205020404" pitchFamily="49" charset="0"/>
+                <a:cs typeface="Courier New" panose="02070309020205020404" pitchFamily="49" charset="0"/>
+              </a:rPr>
               <a:t>const</a:t>
             </a:r>
             <a:r>
-              <a:rPr lang="it-IT" dirty="0"/>
+              <a:rPr lang="it-IT" b="1" dirty="0">
+                <a:latin typeface="Courier New" panose="02070309020205020404" pitchFamily="49" charset="0"/>
+                <a:cs typeface="Courier New" panose="02070309020205020404" pitchFamily="49" charset="0"/>
+              </a:rPr>
               <a:t> </a:t>
             </a:r>
             <a:r>
-              <a:rPr lang="it-IT" dirty="0" err="1"/>
+              <a:rPr lang="it-IT" b="1" dirty="0" err="1">
+                <a:latin typeface="Courier New" panose="02070309020205020404" pitchFamily="49" charset="0"/>
+                <a:cs typeface="Courier New" panose="02070309020205020404" pitchFamily="49" charset="0"/>
+              </a:rPr>
               <a:t>Mat</a:t>
             </a:r>
             <a:r>
-              <a:rPr lang="it-IT" dirty="0"/>
+              <a:rPr lang="it-IT" b="1" dirty="0">
+                <a:latin typeface="Courier New" panose="02070309020205020404" pitchFamily="49" charset="0"/>
+                <a:cs typeface="Courier New" panose="02070309020205020404" pitchFamily="49" charset="0"/>
+              </a:rPr>
               <a:t>&amp; </a:t>
             </a:r>
             <a:r>
-              <a:rPr lang="it-IT" dirty="0" err="1"/>
+              <a:rPr lang="it-IT" b="1" dirty="0" err="1">
+                <a:latin typeface="Courier New" panose="02070309020205020404" pitchFamily="49" charset="0"/>
+                <a:cs typeface="Courier New" panose="02070309020205020404" pitchFamily="49" charset="0"/>
+              </a:rPr>
               <a:t>distCoeffs</a:t>
             </a:r>
             <a:r>
-              <a:rPr lang="it-IT" dirty="0"/>
+              <a:rPr lang="it-IT" b="1" dirty="0">
+                <a:latin typeface="Courier New" panose="02070309020205020404" pitchFamily="49" charset="0"/>
+                <a:cs typeface="Courier New" panose="02070309020205020404" pitchFamily="49" charset="0"/>
+              </a:rPr>
               <a:t>,</a:t>
             </a:r>
           </a:p>
           <a:p>
             <a:r>
-              <a:rPr lang="it-IT" dirty="0"/>
+              <a:rPr lang="it-IT" b="1" dirty="0">
+                <a:latin typeface="Courier New" panose="02070309020205020404" pitchFamily="49" charset="0"/>
+                <a:cs typeface="Courier New" panose="02070309020205020404" pitchFamily="49" charset="0"/>
+              </a:rPr>
               <a:t>	</a:t>
             </a:r>
             <a:r>
-              <a:rPr lang="it-IT" dirty="0" err="1"/>
+              <a:rPr lang="it-IT" b="1" dirty="0" err="1">
+                <a:latin typeface="Courier New" panose="02070309020205020404" pitchFamily="49" charset="0"/>
+                <a:cs typeface="Courier New" panose="02070309020205020404" pitchFamily="49" charset="0"/>
+              </a:rPr>
               <a:t>Mat</a:t>
             </a:r>
             <a:r>
-              <a:rPr lang="it-IT" dirty="0"/>
+              <a:rPr lang="it-IT" b="1" dirty="0">
+                <a:latin typeface="Courier New" panose="02070309020205020404" pitchFamily="49" charset="0"/>
+                <a:cs typeface="Courier New" panose="02070309020205020404" pitchFamily="49" charset="0"/>
+              </a:rPr>
               <a:t>&amp; </a:t>
             </a:r>
             <a:r>
-              <a:rPr lang="it-IT" dirty="0" err="1"/>
+              <a:rPr lang="it-IT" b="1" dirty="0" err="1">
+                <a:latin typeface="Courier New" panose="02070309020205020404" pitchFamily="49" charset="0"/>
+                <a:cs typeface="Courier New" panose="02070309020205020404" pitchFamily="49" charset="0"/>
+              </a:rPr>
               <a:t>rvec</a:t>
             </a:r>
             <a:r>
-              <a:rPr lang="it-IT" dirty="0"/>
+              <a:rPr lang="it-IT" b="1" dirty="0">
+                <a:latin typeface="Courier New" panose="02070309020205020404" pitchFamily="49" charset="0"/>
+                <a:cs typeface="Courier New" panose="02070309020205020404" pitchFamily="49" charset="0"/>
+              </a:rPr>
               <a:t>,</a:t>
             </a:r>
           </a:p>
           <a:p>
             <a:r>
-              <a:rPr lang="it-IT" dirty="0"/>
+              <a:rPr lang="it-IT" b="1" dirty="0">
+                <a:latin typeface="Courier New" panose="02070309020205020404" pitchFamily="49" charset="0"/>
+                <a:cs typeface="Courier New" panose="02070309020205020404" pitchFamily="49" charset="0"/>
+              </a:rPr>
               <a:t>	</a:t>
             </a:r>
             <a:r>
-              <a:rPr lang="it-IT" dirty="0" err="1"/>
+              <a:rPr lang="it-IT" b="1" dirty="0" err="1">
+                <a:latin typeface="Courier New" panose="02070309020205020404" pitchFamily="49" charset="0"/>
+                <a:cs typeface="Courier New" panose="02070309020205020404" pitchFamily="49" charset="0"/>
+              </a:rPr>
               <a:t>Mat</a:t>
             </a:r>
             <a:r>
-              <a:rPr lang="it-IT" dirty="0"/>
+              <a:rPr lang="it-IT" b="1" dirty="0">
+                <a:latin typeface="Courier New" panose="02070309020205020404" pitchFamily="49" charset="0"/>
+                <a:cs typeface="Courier New" panose="02070309020205020404" pitchFamily="49" charset="0"/>
+              </a:rPr>
               <a:t>&amp; </a:t>
             </a:r>
             <a:r>
-              <a:rPr lang="it-IT" dirty="0" err="1"/>
+              <a:rPr lang="it-IT" b="1" dirty="0" err="1">
+                <a:latin typeface="Courier New" panose="02070309020205020404" pitchFamily="49" charset="0"/>
+                <a:cs typeface="Courier New" panose="02070309020205020404" pitchFamily="49" charset="0"/>
+              </a:rPr>
               <a:t>tvec</a:t>
             </a:r>
-            <a:endParaRPr lang="it-IT" dirty="0"/>
-          </a:p>
-          <a:p>
-            <a:r>
-              <a:rPr lang="it-IT" dirty="0"/>
+            <a:endParaRPr lang="it-IT" b="1" dirty="0">
+              <a:latin typeface="Courier New" panose="02070309020205020404" pitchFamily="49" charset="0"/>
+              <a:cs typeface="Courier New" panose="02070309020205020404" pitchFamily="49" charset="0"/>
+            </a:endParaRPr>
+          </a:p>
+          <a:p>
+            <a:r>
+              <a:rPr lang="it-IT" b="1" dirty="0">
+                <a:latin typeface="Courier New" panose="02070309020205020404" pitchFamily="49" charset="0"/>
+                <a:cs typeface="Courier New" panose="02070309020205020404" pitchFamily="49" charset="0"/>
+              </a:rPr>
               <a:t>);</a:t>
             </a:r>
-            <a:endParaRPr lang="it-IT" sz="2200" dirty="0">
-              <a:solidFill>
-                <a:schemeClr val="bg1"/>
-              </a:solidFill>
-              <a:latin typeface="Arial Rounded MT Bold" panose="020F0704030504030204" pitchFamily="34" charset="0"/>
+            <a:endParaRPr lang="it-IT" sz="2200" b="1" dirty="0">
+              <a:latin typeface="Courier New" panose="02070309020205020404" pitchFamily="49" charset="0"/>
+              <a:cs typeface="Courier New" panose="02070309020205020404" pitchFamily="49" charset="0"/>
             </a:endParaRPr>
           </a:p>
         </p:txBody>
@@ -12485,269 +12852,6 @@
 </p:sld>
 </file>
 
-<file path=ppt/slides/slide24.xml><?xml version="1.0" encoding="utf-8"?>
-<p:sld xmlns:a="http://schemas.openxmlformats.org/drawingml/2006/main" xmlns:r="http://schemas.openxmlformats.org/officeDocument/2006/relationships" xmlns:p="http://schemas.openxmlformats.org/presentationml/2006/main">
-  <p:cSld>
-    <p:spTree>
-      <p:nvGrpSpPr>
-        <p:cNvPr id="1" name=""/>
-        <p:cNvGrpSpPr/>
-        <p:nvPr/>
-      </p:nvGrpSpPr>
-      <p:grpSpPr>
-        <a:xfrm>
-          <a:off x="0" y="0"/>
-          <a:ext cx="0" cy="0"/>
-          <a:chOff x="0" y="0"/>
-          <a:chExt cx="0" cy="0"/>
-        </a:xfrm>
-      </p:grpSpPr>
-      <p:sp>
-        <p:nvSpPr>
-          <p:cNvPr id="7" name="Titolo 6">
-            <a:extLst>
-              <a:ext uri="{FF2B5EF4-FFF2-40B4-BE49-F238E27FC236}">
-                <a16:creationId xmlns:a16="http://schemas.microsoft.com/office/drawing/2014/main" id="{C16E6962-1B7B-4389-81F2-F4D60E008C63}"/>
-              </a:ext>
-            </a:extLst>
-          </p:cNvPr>
-          <p:cNvSpPr>
-            <a:spLocks noGrp="1"/>
-          </p:cNvSpPr>
-          <p:nvPr>
-            <p:ph type="title"/>
-          </p:nvPr>
-        </p:nvSpPr>
-        <p:spPr>
-          <a:xfrm>
-            <a:off x="1876320" y="0"/>
-            <a:ext cx="8790840" cy="2386800"/>
-          </a:xfrm>
-        </p:spPr>
-        <p:txBody>
-          <a:bodyPr/>
-          <a:lstStyle/>
-          <a:p>
-            <a:pPr algn="ctr"/>
-            <a:r>
-              <a:rPr lang="it-IT" spc="-1" dirty="0">
-                <a:uFill>
-                  <a:solidFill>
-                    <a:srgbClr val="FFFFFF"/>
-                  </a:solidFill>
-                </a:uFill>
-                <a:latin typeface="Arial Rounded MT Bold" panose="020F0704030504030204" pitchFamily="34" charset="0"/>
-              </a:rPr>
-              <a:t>Markerless</a:t>
-            </a:r>
-            <a:endParaRPr lang="en-GB" dirty="0">
-              <a:latin typeface="Arial Rounded MT Bold" panose="020F0704030504030204" pitchFamily="34" charset="0"/>
-            </a:endParaRPr>
-          </a:p>
-        </p:txBody>
-      </p:sp>
-      <p:sp>
-        <p:nvSpPr>
-          <p:cNvPr id="8" name="Segnaposto testo 7">
-            <a:extLst>
-              <a:ext uri="{FF2B5EF4-FFF2-40B4-BE49-F238E27FC236}">
-                <a16:creationId xmlns:a16="http://schemas.microsoft.com/office/drawing/2014/main" id="{1DE4F4F2-B148-48F9-A3B2-A119636CB3EC}"/>
-              </a:ext>
-            </a:extLst>
-          </p:cNvPr>
-          <p:cNvSpPr>
-            <a:spLocks noGrp="1"/>
-          </p:cNvSpPr>
-          <p:nvPr>
-            <p:ph idx="1"/>
-          </p:nvPr>
-        </p:nvSpPr>
-        <p:spPr>
-          <a:xfrm>
-            <a:off x="609480" y="1727999"/>
-            <a:ext cx="10972080" cy="5130001"/>
-          </a:xfrm>
-        </p:spPr>
-        <p:txBody>
-          <a:bodyPr anchor="t">
-            <a:noAutofit/>
-          </a:bodyPr>
-          <a:lstStyle/>
-          <a:p>
-            <a:pPr marL="0" indent="0">
-              <a:spcBef>
-                <a:spcPts val="1200"/>
-              </a:spcBef>
-              <a:buNone/>
-            </a:pPr>
-            <a:r>
-              <a:rPr lang="it-IT" sz="2200" dirty="0">
-                <a:solidFill>
-                  <a:schemeClr val="bg1"/>
-                </a:solidFill>
-                <a:latin typeface="Arial Rounded MT Bold" panose="020F0704030504030204" pitchFamily="34" charset="0"/>
-              </a:rPr>
-              <a:t>Il marcatore hanno diversi vantaggi:</a:t>
-            </a:r>
-          </a:p>
-          <a:p>
-            <a:pPr marL="457200" indent="-457200">
-              <a:spcBef>
-                <a:spcPts val="1200"/>
-              </a:spcBef>
-              <a:buFont typeface="+mj-lt"/>
-              <a:buAutoNum type="arabicPeriod"/>
-            </a:pPr>
-            <a:r>
-              <a:rPr lang="it-IT" sz="2200" dirty="0">
-                <a:solidFill>
-                  <a:schemeClr val="bg1"/>
-                </a:solidFill>
-                <a:latin typeface="Arial Rounded MT Bold" panose="020F0704030504030204" pitchFamily="34" charset="0"/>
-              </a:rPr>
-              <a:t>individuarli è poco oneroso dal punto di vista computazionale,</a:t>
-            </a:r>
-          </a:p>
-          <a:p>
-            <a:pPr marL="457200" indent="-457200">
-              <a:spcBef>
-                <a:spcPts val="1200"/>
-              </a:spcBef>
-              <a:buFont typeface="+mj-lt"/>
-              <a:buAutoNum type="arabicPeriod"/>
-            </a:pPr>
-            <a:r>
-              <a:rPr lang="it-IT" sz="2200" dirty="0">
-                <a:solidFill>
-                  <a:schemeClr val="bg1"/>
-                </a:solidFill>
-                <a:latin typeface="Arial Rounded MT Bold" panose="020F0704030504030204" pitchFamily="34" charset="0"/>
-              </a:rPr>
-              <a:t>robusti al cambiamento di luce</a:t>
-            </a:r>
-          </a:p>
-          <a:p>
-            <a:pPr marL="0" indent="0">
-              <a:spcBef>
-                <a:spcPts val="1200"/>
-              </a:spcBef>
-              <a:buNone/>
-            </a:pPr>
-            <a:r>
-              <a:rPr lang="it-IT" sz="2200" dirty="0">
-                <a:solidFill>
-                  <a:schemeClr val="bg1"/>
-                </a:solidFill>
-                <a:latin typeface="Arial Rounded MT Bold" panose="020F0704030504030204" pitchFamily="34" charset="0"/>
-              </a:rPr>
-              <a:t>Il marcatore però presenta diversi problemi:</a:t>
-            </a:r>
-          </a:p>
-          <a:p>
-            <a:pPr marL="457200" indent="-457200">
-              <a:spcBef>
-                <a:spcPts val="1200"/>
-              </a:spcBef>
-              <a:buFont typeface="+mj-lt"/>
-              <a:buAutoNum type="arabicPeriod"/>
-            </a:pPr>
-            <a:r>
-              <a:rPr lang="it-IT" sz="2200" dirty="0">
-                <a:solidFill>
-                  <a:schemeClr val="bg1"/>
-                </a:solidFill>
-                <a:latin typeface="Arial Rounded MT Bold" panose="020F0704030504030204" pitchFamily="34" charset="0"/>
-              </a:rPr>
-              <a:t>non funziona se è parzialmente sovrapposto;</a:t>
-            </a:r>
-          </a:p>
-          <a:p>
-            <a:pPr marL="457200" indent="-457200">
-              <a:spcBef>
-                <a:spcPts val="1200"/>
-              </a:spcBef>
-              <a:buFont typeface="+mj-lt"/>
-              <a:buAutoNum type="arabicPeriod"/>
-            </a:pPr>
-            <a:r>
-              <a:rPr lang="it-IT" sz="2200" dirty="0">
-                <a:solidFill>
-                  <a:schemeClr val="bg1"/>
-                </a:solidFill>
-                <a:latin typeface="Arial Rounded MT Bold" panose="020F0704030504030204" pitchFamily="34" charset="0"/>
-              </a:rPr>
-              <a:t>l’immagine deve essere bianca e nera;</a:t>
-            </a:r>
-          </a:p>
-          <a:p>
-            <a:pPr marL="457200" indent="-457200">
-              <a:spcBef>
-                <a:spcPts val="1200"/>
-              </a:spcBef>
-              <a:buFont typeface="+mj-lt"/>
-              <a:buAutoNum type="arabicPeriod"/>
-            </a:pPr>
-            <a:r>
-              <a:rPr lang="it-IT" sz="2200" dirty="0">
-                <a:solidFill>
-                  <a:schemeClr val="bg1"/>
-                </a:solidFill>
-                <a:latin typeface="Arial Rounded MT Bold" panose="020F0704030504030204" pitchFamily="34" charset="0"/>
-              </a:rPr>
-              <a:t>deve avere una forma quadrata</a:t>
-            </a:r>
-          </a:p>
-          <a:p>
-            <a:pPr marL="457200" indent="-457200">
-              <a:spcBef>
-                <a:spcPts val="1200"/>
-              </a:spcBef>
-              <a:buFont typeface="+mj-lt"/>
-              <a:buAutoNum type="arabicPeriod"/>
-            </a:pPr>
-            <a:r>
-              <a:rPr lang="it-IT" sz="2200" dirty="0">
-                <a:solidFill>
-                  <a:schemeClr val="bg1"/>
-                </a:solidFill>
-                <a:latin typeface="Arial Rounded MT Bold" panose="020F0704030504030204" pitchFamily="34" charset="0"/>
-              </a:rPr>
-              <a:t>ha una forma estetica poco accattivante;</a:t>
-            </a:r>
-          </a:p>
-          <a:p>
-            <a:pPr marL="457200" indent="-457200">
-              <a:spcBef>
-                <a:spcPts val="1200"/>
-              </a:spcBef>
-              <a:buFont typeface="+mj-lt"/>
-              <a:buAutoNum type="arabicPeriod"/>
-            </a:pPr>
-            <a:r>
-              <a:rPr lang="it-IT" sz="2200" dirty="0">
-                <a:solidFill>
-                  <a:schemeClr val="bg1"/>
-                </a:solidFill>
-                <a:latin typeface="Arial Rounded MT Bold" panose="020F0704030504030204" pitchFamily="34" charset="0"/>
-              </a:rPr>
-              <a:t>non ha nulla a che vedere con la realtà.</a:t>
-            </a:r>
-          </a:p>
-        </p:txBody>
-      </p:sp>
-    </p:spTree>
-    <p:extLst>
-      <p:ext uri="{BB962C8B-B14F-4D97-AF65-F5344CB8AC3E}">
-        <p14:creationId xmlns:p14="http://schemas.microsoft.com/office/powerpoint/2010/main" val="3840775050"/>
-      </p:ext>
-    </p:extLst>
-  </p:cSld>
-  <p:clrMapOvr>
-    <a:masterClrMapping/>
-  </p:clrMapOvr>
-</p:sld>
-</file>
-
 <file path=ppt/slides/slide25.xml><?xml version="1.0" encoding="utf-8"?>
 <p:sld xmlns:a="http://schemas.openxmlformats.org/drawingml/2006/main" xmlns:r="http://schemas.openxmlformats.org/officeDocument/2006/relationships" xmlns:p="http://schemas.openxmlformats.org/presentationml/2006/main">
   <p:cSld>
@@ -12850,14 +12954,16 @@
                 </a:solidFill>
                 <a:latin typeface="Arial Rounded MT Bold" panose="020F0704030504030204" pitchFamily="34" charset="0"/>
               </a:rPr>
-              <a:t>La tecnica AR markerless  si basa sul riconoscimento di un oggetto che esiste nel mondo reale. I vantaggi di questa tecnica sono:</a:t>
-            </a:r>
-          </a:p>
-          <a:p>
-            <a:pPr>
+              <a:t>Il marcatore hanno diversi vantaggi:</a:t>
+            </a:r>
+          </a:p>
+          <a:p>
+            <a:pPr marL="457200" indent="-457200">
               <a:spcBef>
                 <a:spcPts val="1200"/>
               </a:spcBef>
+              <a:buFont typeface="+mj-lt"/>
+              <a:buAutoNum type="arabicPeriod"/>
             </a:pPr>
             <a:r>
               <a:rPr lang="it-IT" sz="2200" dirty="0">
@@ -12866,14 +12972,16 @@
                 </a:solidFill>
                 <a:latin typeface="Arial Rounded MT Bold" panose="020F0704030504030204" pitchFamily="34" charset="0"/>
               </a:rPr>
-              <a:t>possono essere utilizzati per cercare oggetti reali,</a:t>
-            </a:r>
-          </a:p>
-          <a:p>
-            <a:pPr>
+              <a:t>individuarli è poco oneroso dal punto di vista computazionale,</a:t>
+            </a:r>
+          </a:p>
+          <a:p>
+            <a:pPr marL="457200" indent="-457200">
               <a:spcBef>
                 <a:spcPts val="1200"/>
               </a:spcBef>
+              <a:buFont typeface="+mj-lt"/>
+              <a:buAutoNum type="arabicPeriod"/>
             </a:pPr>
             <a:r>
               <a:rPr lang="it-IT" sz="2200" dirty="0">
@@ -12882,7 +12990,7 @@
                 </a:solidFill>
                 <a:latin typeface="Arial Rounded MT Bold" panose="020F0704030504030204" pitchFamily="34" charset="0"/>
               </a:rPr>
-              <a:t>funziona anche quando l’oggetto è parzialmente nascosto,</a:t>
+              <a:t>robusti al cambiamento di luce</a:t>
             </a:r>
           </a:p>
           <a:p>
@@ -12899,14 +13007,16 @@
                 </a:solidFill>
                 <a:latin typeface="Arial Rounded MT Bold" panose="020F0704030504030204" pitchFamily="34" charset="0"/>
               </a:rPr>
-              <a:t>Lo svantaggio principale di questa tecnica sono:</a:t>
-            </a:r>
-          </a:p>
-          <a:p>
-            <a:pPr>
+              <a:t>Il marcatore però presenta diversi problemi:</a:t>
+            </a:r>
+          </a:p>
+          <a:p>
+            <a:pPr marL="457200" indent="-457200">
               <a:spcBef>
                 <a:spcPts val="1200"/>
               </a:spcBef>
+              <a:buFont typeface="+mj-lt"/>
+              <a:buAutoNum type="arabicPeriod"/>
             </a:pPr>
             <a:r>
               <a:rPr lang="it-IT" sz="2200" dirty="0">
@@ -12915,14 +13025,16 @@
                 </a:solidFill>
                 <a:latin typeface="Arial Rounded MT Bold" panose="020F0704030504030204" pitchFamily="34" charset="0"/>
               </a:rPr>
-              <a:t>il riconoscimento del marker è dispendioso, si ha come conseguenza un FPS minore,</a:t>
-            </a:r>
-          </a:p>
-          <a:p>
-            <a:pPr>
+              <a:t>non funziona se è parzialmente sovrapposto;</a:t>
+            </a:r>
+          </a:p>
+          <a:p>
+            <a:pPr marL="457200" indent="-457200">
               <a:spcBef>
                 <a:spcPts val="1200"/>
               </a:spcBef>
+              <a:buFont typeface="+mj-lt"/>
+              <a:buAutoNum type="arabicPeriod"/>
             </a:pPr>
             <a:r>
               <a:rPr lang="it-IT" sz="2200" dirty="0">
@@ -12931,15 +13043,16 @@
                 </a:solidFill>
                 <a:latin typeface="Arial Rounded MT Bold" panose="020F0704030504030204" pitchFamily="34" charset="0"/>
               </a:rPr>
-              <a:t>la stima della posa non è precisa.</a:t>
-            </a:r>
-          </a:p>
-          <a:p>
-            <a:pPr marL="0" indent="0">
+              <a:t>l’immagine deve essere bianca e nera;</a:t>
+            </a:r>
+          </a:p>
+          <a:p>
+            <a:pPr marL="457200" indent="-457200">
               <a:spcBef>
                 <a:spcPts val="1200"/>
               </a:spcBef>
-              <a:buNone/>
+              <a:buFont typeface="+mj-lt"/>
+              <a:buAutoNum type="arabicPeriod"/>
             </a:pPr>
             <a:r>
               <a:rPr lang="it-IT" sz="2200" dirty="0">
@@ -12948,7 +13061,43 @@
                 </a:solidFill>
                 <a:latin typeface="Arial Rounded MT Bold" panose="020F0704030504030204" pitchFamily="34" charset="0"/>
               </a:rPr>
-              <a:t>L’immagine deve essere rilevata anche quando è ruotata, ha dimensioni diverse oppure la scena presenta una diversa luminosità.</a:t>
+              <a:t>deve avere una forma quadrata</a:t>
+            </a:r>
+          </a:p>
+          <a:p>
+            <a:pPr marL="457200" indent="-457200">
+              <a:spcBef>
+                <a:spcPts val="1200"/>
+              </a:spcBef>
+              <a:buFont typeface="+mj-lt"/>
+              <a:buAutoNum type="arabicPeriod"/>
+            </a:pPr>
+            <a:r>
+              <a:rPr lang="it-IT" sz="2200" dirty="0">
+                <a:solidFill>
+                  <a:schemeClr val="bg1"/>
+                </a:solidFill>
+                <a:latin typeface="Arial Rounded MT Bold" panose="020F0704030504030204" pitchFamily="34" charset="0"/>
+              </a:rPr>
+              <a:t>ha una forma estetica poco accattivante;</a:t>
+            </a:r>
+          </a:p>
+          <a:p>
+            <a:pPr marL="457200" indent="-457200">
+              <a:spcBef>
+                <a:spcPts val="1200"/>
+              </a:spcBef>
+              <a:buFont typeface="+mj-lt"/>
+              <a:buAutoNum type="arabicPeriod"/>
+            </a:pPr>
+            <a:r>
+              <a:rPr lang="it-IT" sz="2200" dirty="0">
+                <a:solidFill>
+                  <a:schemeClr val="bg1"/>
+                </a:solidFill>
+                <a:latin typeface="Arial Rounded MT Bold" panose="020F0704030504030204" pitchFamily="34" charset="0"/>
+              </a:rPr>
+              <a:t>non ha nulla a che vedere con la realtà.</a:t>
             </a:r>
           </a:p>
         </p:txBody>
@@ -12956,7 +13105,7 @@
     </p:spTree>
     <p:extLst>
       <p:ext uri="{BB962C8B-B14F-4D97-AF65-F5344CB8AC3E}">
-        <p14:creationId xmlns:p14="http://schemas.microsoft.com/office/powerpoint/2010/main" val="2301985808"/>
+        <p14:creationId xmlns:p14="http://schemas.microsoft.com/office/powerpoint/2010/main" val="3840775050"/>
       </p:ext>
     </p:extLst>
   </p:cSld>
@@ -13001,8 +13150,8 @@
         </p:nvSpPr>
         <p:spPr>
           <a:xfrm>
-            <a:off x="0" y="0"/>
-            <a:ext cx="12192000" cy="2386800"/>
+            <a:off x="1876320" y="0"/>
+            <a:ext cx="8790840" cy="2386800"/>
           </a:xfrm>
         </p:spPr>
         <p:txBody>
@@ -13019,20 +13168,9 @@
                 </a:uFill>
                 <a:latin typeface="Arial Rounded MT Bold" panose="020F0704030504030204" pitchFamily="34" charset="0"/>
               </a:rPr>
-              <a:t>Features point and features </a:t>
-            </a:r>
-            <a:r>
-              <a:rPr lang="en-US" spc="-1" dirty="0">
-                <a:uFill>
-                  <a:solidFill>
-                    <a:srgbClr val="FFFFFF"/>
-                  </a:solidFill>
-                </a:uFill>
-                <a:latin typeface="Arial Rounded MT Bold" panose="020F0704030504030204" pitchFamily="34" charset="0"/>
-              </a:rPr>
-              <a:t>descriptor</a:t>
-            </a:r>
-            <a:endParaRPr lang="en-US" dirty="0">
+              <a:t>Markerless</a:t>
+            </a:r>
+            <a:endParaRPr lang="en-GB" dirty="0">
               <a:latin typeface="Arial Rounded MT Bold" panose="020F0704030504030204" pitchFamily="34" charset="0"/>
             </a:endParaRPr>
           </a:p>
@@ -13079,7 +13217,39 @@
                 </a:solidFill>
                 <a:latin typeface="Arial Rounded MT Bold" panose="020F0704030504030204" pitchFamily="34" charset="0"/>
               </a:rPr>
-              <a:t>Non c’è una definizione di cosa una features sia, la definizione dipende spesso dalla specifica applicazione. Si può pensare ad una feature coma ad una parte «interessante» dell’immagine.</a:t>
+              <a:t>La tecnica AR markerless  si basa sul riconoscimento di un oggetto che esiste nel mondo reale. I vantaggi di questa tecnica sono:</a:t>
+            </a:r>
+          </a:p>
+          <a:p>
+            <a:pPr>
+              <a:spcBef>
+                <a:spcPts val="1200"/>
+              </a:spcBef>
+            </a:pPr>
+            <a:r>
+              <a:rPr lang="it-IT" sz="2200" dirty="0">
+                <a:solidFill>
+                  <a:schemeClr val="bg1"/>
+                </a:solidFill>
+                <a:latin typeface="Arial Rounded MT Bold" panose="020F0704030504030204" pitchFamily="34" charset="0"/>
+              </a:rPr>
+              <a:t>possono essere utilizzati per cercare oggetti reali,</a:t>
+            </a:r>
+          </a:p>
+          <a:p>
+            <a:pPr>
+              <a:spcBef>
+                <a:spcPts val="1200"/>
+              </a:spcBef>
+            </a:pPr>
+            <a:r>
+              <a:rPr lang="it-IT" sz="2200" dirty="0">
+                <a:solidFill>
+                  <a:schemeClr val="bg1"/>
+                </a:solidFill>
+                <a:latin typeface="Arial Rounded MT Bold" panose="020F0704030504030204" pitchFamily="34" charset="0"/>
+              </a:rPr>
+              <a:t>funziona anche quando l’oggetto è parzialmente nascosto,</a:t>
             </a:r>
           </a:p>
           <a:p>
@@ -13096,7 +13266,39 @@
                 </a:solidFill>
                 <a:latin typeface="Arial Rounded MT Bold" panose="020F0704030504030204" pitchFamily="34" charset="0"/>
               </a:rPr>
-              <a:t>Per feature point intendo un punto dell’immagine definito da un punto, un raggio ed un orientamento.</a:t>
+              <a:t>Lo svantaggio principale di questa tecnica sono:</a:t>
+            </a:r>
+          </a:p>
+          <a:p>
+            <a:pPr>
+              <a:spcBef>
+                <a:spcPts val="1200"/>
+              </a:spcBef>
+            </a:pPr>
+            <a:r>
+              <a:rPr lang="it-IT" sz="2200" dirty="0">
+                <a:solidFill>
+                  <a:schemeClr val="bg1"/>
+                </a:solidFill>
+                <a:latin typeface="Arial Rounded MT Bold" panose="020F0704030504030204" pitchFamily="34" charset="0"/>
+              </a:rPr>
+              <a:t>il riconoscimento del marker è dispendioso, si ha come conseguenza un FPS minore,</a:t>
+            </a:r>
+          </a:p>
+          <a:p>
+            <a:pPr>
+              <a:spcBef>
+                <a:spcPts val="1200"/>
+              </a:spcBef>
+            </a:pPr>
+            <a:r>
+              <a:rPr lang="it-IT" sz="2200" dirty="0">
+                <a:solidFill>
+                  <a:schemeClr val="bg1"/>
+                </a:solidFill>
+                <a:latin typeface="Arial Rounded MT Bold" panose="020F0704030504030204" pitchFamily="34" charset="0"/>
+              </a:rPr>
+              <a:t>la stima della posa non è precisa.</a:t>
             </a:r>
           </a:p>
           <a:p>
@@ -13113,25 +13315,7 @@
                 </a:solidFill>
                 <a:latin typeface="Arial Rounded MT Bold" panose="020F0704030504030204" pitchFamily="34" charset="0"/>
               </a:rPr>
-              <a:t>Ogni algoritmo di </a:t>
-            </a:r>
-            <a:r>
-              <a:rPr lang="en-US" sz="2200" dirty="0">
-                <a:solidFill>
-                  <a:schemeClr val="bg1"/>
-                </a:solidFill>
-                <a:latin typeface="Arial Rounded MT Bold" panose="020F0704030504030204" pitchFamily="34" charset="0"/>
-              </a:rPr>
-              <a:t>feature-detection</a:t>
-            </a:r>
-            <a:r>
-              <a:rPr lang="it-IT" sz="2200" dirty="0">
-                <a:solidFill>
-                  <a:schemeClr val="bg1"/>
-                </a:solidFill>
-                <a:latin typeface="Arial Rounded MT Bold" panose="020F0704030504030204" pitchFamily="34" charset="0"/>
-              </a:rPr>
-              <a:t> cerca di rilevare le stesse feature a prescindere dalla trasformazione applicata all’immagine.</a:t>
+              <a:t>L’immagine deve essere rilevata anche quando è ruotata, ha dimensioni diverse oppure la scena presenta una diversa luminosità.</a:t>
             </a:r>
           </a:p>
         </p:txBody>
@@ -13139,7 +13323,7 @@
     </p:spTree>
     <p:extLst>
       <p:ext uri="{BB962C8B-B14F-4D97-AF65-F5344CB8AC3E}">
-        <p14:creationId xmlns:p14="http://schemas.microsoft.com/office/powerpoint/2010/main" val="3411633505"/>
+        <p14:creationId xmlns:p14="http://schemas.microsoft.com/office/powerpoint/2010/main" val="2301985808"/>
       </p:ext>
     </p:extLst>
   </p:cSld>
@@ -13202,7 +13386,7 @@
                 </a:uFill>
                 <a:latin typeface="Arial Rounded MT Bold" panose="020F0704030504030204" pitchFamily="34" charset="0"/>
               </a:rPr>
-              <a:t>Features </a:t>
+              <a:t>Features point and features </a:t>
             </a:r>
             <a:r>
               <a:rPr lang="en-US" spc="-1" dirty="0">
@@ -13213,7 +13397,7 @@
                 </a:uFill>
                 <a:latin typeface="Arial Rounded MT Bold" panose="020F0704030504030204" pitchFamily="34" charset="0"/>
               </a:rPr>
-              <a:t>extraction</a:t>
+              <a:t>descriptor</a:t>
             </a:r>
             <a:endParaRPr lang="en-US" dirty="0">
               <a:latin typeface="Arial Rounded MT Bold" panose="020F0704030504030204" pitchFamily="34" charset="0"/>
@@ -13262,61 +13446,7 @@
                 </a:solidFill>
                 <a:latin typeface="Arial Rounded MT Bold" panose="020F0704030504030204" pitchFamily="34" charset="0"/>
               </a:rPr>
-              <a:t>Ci sono numerosi algoritmi di features-</a:t>
-            </a:r>
-            <a:r>
-              <a:rPr lang="it-IT" sz="2200" dirty="0" err="1">
-                <a:solidFill>
-                  <a:schemeClr val="bg1"/>
-                </a:solidFill>
-                <a:latin typeface="Arial Rounded MT Bold" panose="020F0704030504030204" pitchFamily="34" charset="0"/>
-              </a:rPr>
-              <a:t>detection</a:t>
-            </a:r>
-            <a:r>
-              <a:rPr lang="it-IT" sz="2200" dirty="0">
-                <a:solidFill>
-                  <a:schemeClr val="bg1"/>
-                </a:solidFill>
-                <a:latin typeface="Arial Rounded MT Bold" panose="020F0704030504030204" pitchFamily="34" charset="0"/>
-              </a:rPr>
-              <a:t>, in questa presentazione parlerò del corner-</a:t>
-            </a:r>
-            <a:r>
-              <a:rPr lang="it-IT" sz="2200" dirty="0" err="1">
-                <a:solidFill>
-                  <a:schemeClr val="bg1"/>
-                </a:solidFill>
-                <a:latin typeface="Arial Rounded MT Bold" panose="020F0704030504030204" pitchFamily="34" charset="0"/>
-              </a:rPr>
-              <a:t>detection</a:t>
-            </a:r>
-            <a:r>
-              <a:rPr lang="it-IT" sz="2200" dirty="0">
-                <a:solidFill>
-                  <a:schemeClr val="bg1"/>
-                </a:solidFill>
-                <a:latin typeface="Arial Rounded MT Bold" panose="020F0704030504030204" pitchFamily="34" charset="0"/>
-              </a:rPr>
-              <a:t>. Gli algoritmi di corner-</a:t>
-            </a:r>
-            <a:r>
-              <a:rPr lang="it-IT" sz="2200" dirty="0" err="1">
-                <a:solidFill>
-                  <a:schemeClr val="bg1"/>
-                </a:solidFill>
-                <a:latin typeface="Arial Rounded MT Bold" panose="020F0704030504030204" pitchFamily="34" charset="0"/>
-              </a:rPr>
-              <a:t>detection</a:t>
-            </a:r>
-            <a:r>
-              <a:rPr lang="it-IT" sz="2200" dirty="0">
-                <a:solidFill>
-                  <a:schemeClr val="bg1"/>
-                </a:solidFill>
-                <a:latin typeface="Arial Rounded MT Bold" panose="020F0704030504030204" pitchFamily="34" charset="0"/>
-              </a:rPr>
-              <a:t> si basano su una rapida variazione del gradiente dell’immagine.</a:t>
+              <a:t>Non c’è una definizione di cosa una features sia, la definizione dipende spesso dalla specifica applicazione. Si può pensare ad una feature coma ad una parte «interessante» dell’immagine.</a:t>
             </a:r>
           </a:p>
           <a:p>
@@ -13333,7 +13463,7 @@
                 </a:solidFill>
                 <a:latin typeface="Arial Rounded MT Bold" panose="020F0704030504030204" pitchFamily="34" charset="0"/>
               </a:rPr>
-              <a:t>L’orientamento dei punti è dato dalla direzione del gradiente. In questo modo a prescindere dall’orientamento dell’immagine il feature-point non cambia.</a:t>
+              <a:t>Per feature point intendo un punto dell’immagine definito da un punto, un raggio ed un orientamento.</a:t>
             </a:r>
           </a:p>
           <a:p>
@@ -13350,16 +13480,16 @@
                 </a:solidFill>
                 <a:latin typeface="Arial Rounded MT Bold" panose="020F0704030504030204" pitchFamily="34" charset="0"/>
               </a:rPr>
-              <a:t>I più famosi algoritmi di per il rilevamento dei </a:t>
-            </a:r>
-            <a:r>
-              <a:rPr lang="it-IT" sz="2200" dirty="0" err="1">
+              <a:t>Ogni algoritmo di </a:t>
+            </a:r>
+            <a:r>
+              <a:rPr lang="en-US" sz="2200" dirty="0">
                 <a:solidFill>
                   <a:schemeClr val="bg1"/>
                 </a:solidFill>
                 <a:latin typeface="Arial Rounded MT Bold" panose="020F0704030504030204" pitchFamily="34" charset="0"/>
               </a:rPr>
-              <a:t>keypoints</a:t>
+              <a:t>feature-detection</a:t>
             </a:r>
             <a:r>
               <a:rPr lang="it-IT" sz="2200" dirty="0">
@@ -13368,24 +13498,7 @@
                 </a:solidFill>
                 <a:latin typeface="Arial Rounded MT Bold" panose="020F0704030504030204" pitchFamily="34" charset="0"/>
               </a:rPr>
-              <a:t> sono SIFT e SURF che sfortunatamente non sono liberamente utilizzabili in applicazioni commerciali, ci sono alternative gratuite come ORB o FREAK.</a:t>
-            </a:r>
-          </a:p>
-          <a:p>
-            <a:pPr marL="0" indent="0">
-              <a:spcBef>
-                <a:spcPts val="1200"/>
-              </a:spcBef>
-              <a:buNone/>
-            </a:pPr>
-            <a:r>
-              <a:rPr lang="it-IT" sz="2200" dirty="0">
-                <a:solidFill>
-                  <a:schemeClr val="bg1"/>
-                </a:solidFill>
-                <a:latin typeface="Arial Rounded MT Bold" panose="020F0704030504030204" pitchFamily="34" charset="0"/>
-              </a:rPr>
-              <a:t>SIFT e SURF sono invarianti a rotazione e scala mentre ORB è invariante solo alla rotazione. </a:t>
+              <a:t> cerca di rilevare le stesse feature a prescindere dalla trasformazione applicata all’immagine.</a:t>
             </a:r>
           </a:p>
         </p:txBody>
@@ -13393,7 +13506,7 @@
     </p:spTree>
     <p:extLst>
       <p:ext uri="{BB962C8B-B14F-4D97-AF65-F5344CB8AC3E}">
-        <p14:creationId xmlns:p14="http://schemas.microsoft.com/office/powerpoint/2010/main" val="1562862570"/>
+        <p14:creationId xmlns:p14="http://schemas.microsoft.com/office/powerpoint/2010/main" val="3411633505"/>
       </p:ext>
     </p:extLst>
   </p:cSld>
@@ -13467,7 +13580,7 @@
                 </a:uFill>
                 <a:latin typeface="Arial Rounded MT Bold" panose="020F0704030504030204" pitchFamily="34" charset="0"/>
               </a:rPr>
-              <a:t>Match</a:t>
+              <a:t>extraction</a:t>
             </a:r>
             <a:endParaRPr lang="en-US" dirty="0">
               <a:latin typeface="Arial Rounded MT Bold" panose="020F0704030504030204" pitchFamily="34" charset="0"/>
@@ -13516,7 +13629,61 @@
                 </a:solidFill>
                 <a:latin typeface="Arial Rounded MT Bold" panose="020F0704030504030204" pitchFamily="34" charset="0"/>
               </a:rPr>
-              <a:t>Una volta estratte le features da un immagine si possono comparare con le feature di un’altra immagine.</a:t>
+              <a:t>Ci sono numerosi algoritmi di features-</a:t>
+            </a:r>
+            <a:r>
+              <a:rPr lang="it-IT" sz="2200" dirty="0" err="1">
+                <a:solidFill>
+                  <a:schemeClr val="bg1"/>
+                </a:solidFill>
+                <a:latin typeface="Arial Rounded MT Bold" panose="020F0704030504030204" pitchFamily="34" charset="0"/>
+              </a:rPr>
+              <a:t>detection</a:t>
+            </a:r>
+            <a:r>
+              <a:rPr lang="it-IT" sz="2200" dirty="0">
+                <a:solidFill>
+                  <a:schemeClr val="bg1"/>
+                </a:solidFill>
+                <a:latin typeface="Arial Rounded MT Bold" panose="020F0704030504030204" pitchFamily="34" charset="0"/>
+              </a:rPr>
+              <a:t>, in questa presentazione parlerò del corner-</a:t>
+            </a:r>
+            <a:r>
+              <a:rPr lang="it-IT" sz="2200" dirty="0" err="1">
+                <a:solidFill>
+                  <a:schemeClr val="bg1"/>
+                </a:solidFill>
+                <a:latin typeface="Arial Rounded MT Bold" panose="020F0704030504030204" pitchFamily="34" charset="0"/>
+              </a:rPr>
+              <a:t>detection</a:t>
+            </a:r>
+            <a:r>
+              <a:rPr lang="it-IT" sz="2200" dirty="0">
+                <a:solidFill>
+                  <a:schemeClr val="bg1"/>
+                </a:solidFill>
+                <a:latin typeface="Arial Rounded MT Bold" panose="020F0704030504030204" pitchFamily="34" charset="0"/>
+              </a:rPr>
+              <a:t>. Gli algoritmi di corner-</a:t>
+            </a:r>
+            <a:r>
+              <a:rPr lang="it-IT" sz="2200" dirty="0" err="1">
+                <a:solidFill>
+                  <a:schemeClr val="bg1"/>
+                </a:solidFill>
+                <a:latin typeface="Arial Rounded MT Bold" panose="020F0704030504030204" pitchFamily="34" charset="0"/>
+              </a:rPr>
+              <a:t>detection</a:t>
+            </a:r>
+            <a:r>
+              <a:rPr lang="it-IT" sz="2200" dirty="0">
+                <a:solidFill>
+                  <a:schemeClr val="bg1"/>
+                </a:solidFill>
+                <a:latin typeface="Arial Rounded MT Bold" panose="020F0704030504030204" pitchFamily="34" charset="0"/>
+              </a:rPr>
+              <a:t> si basano su una rapida variazione del gradiente dell’immagine.</a:t>
             </a:r>
           </a:p>
           <a:p>
@@ -13533,7 +13700,7 @@
                 </a:solidFill>
                 <a:latin typeface="Arial Rounded MT Bold" panose="020F0704030504030204" pitchFamily="34" charset="0"/>
               </a:rPr>
-              <a:t>Quando si ha un numero di features «sufficienti si può assumere che l’immagine sia stata trovata.</a:t>
+              <a:t>L’orientamento dei punti è dato dalla direzione del gradiente. In questo modo a prescindere dall’orientamento dell’immagine il feature-point non cambia.</a:t>
             </a:r>
           </a:p>
           <a:p>
@@ -13550,7 +13717,42 @@
                 </a:solidFill>
                 <a:latin typeface="Arial Rounded MT Bold" panose="020F0704030504030204" pitchFamily="34" charset="0"/>
               </a:rPr>
-              <a:t>Nel mio programma di esempio ho utilizzato SURF in quanto per l’immagine scelta da me era l’unico affidabile. La spiegazione però di questo algoritmo va oltre l’obiettivo di questa presentazione.</a:t>
+              <a:t>I più famosi algoritmi di per il rilevamento dei </a:t>
+            </a:r>
+            <a:r>
+              <a:rPr lang="it-IT" sz="2200" dirty="0" err="1">
+                <a:solidFill>
+                  <a:schemeClr val="bg1"/>
+                </a:solidFill>
+                <a:latin typeface="Arial Rounded MT Bold" panose="020F0704030504030204" pitchFamily="34" charset="0"/>
+              </a:rPr>
+              <a:t>keypoints</a:t>
+            </a:r>
+            <a:r>
+              <a:rPr lang="it-IT" sz="2200" dirty="0">
+                <a:solidFill>
+                  <a:schemeClr val="bg1"/>
+                </a:solidFill>
+                <a:latin typeface="Arial Rounded MT Bold" panose="020F0704030504030204" pitchFamily="34" charset="0"/>
+              </a:rPr>
+              <a:t> sono SIFT e SURF che sfortunatamente non sono liberamente utilizzabili in applicazioni commerciali, ci sono alternative gratuite come ORB o FREAK.</a:t>
+            </a:r>
+          </a:p>
+          <a:p>
+            <a:pPr marL="0" indent="0">
+              <a:spcBef>
+                <a:spcPts val="1200"/>
+              </a:spcBef>
+              <a:buNone/>
+            </a:pPr>
+            <a:r>
+              <a:rPr lang="it-IT" sz="2200" dirty="0">
+                <a:solidFill>
+                  <a:schemeClr val="bg1"/>
+                </a:solidFill>
+                <a:latin typeface="Arial Rounded MT Bold" panose="020F0704030504030204" pitchFamily="34" charset="0"/>
+              </a:rPr>
+              <a:t>SIFT e SURF sono invarianti a rotazione e scala mentre ORB è invariante solo alla rotazione. </a:t>
             </a:r>
           </a:p>
         </p:txBody>
@@ -13558,7 +13760,7 @@
     </p:spTree>
     <p:extLst>
       <p:ext uri="{BB962C8B-B14F-4D97-AF65-F5344CB8AC3E}">
-        <p14:creationId xmlns:p14="http://schemas.microsoft.com/office/powerpoint/2010/main" val="2934025429"/>
+        <p14:creationId xmlns:p14="http://schemas.microsoft.com/office/powerpoint/2010/main" val="1562862570"/>
       </p:ext>
     </p:extLst>
   </p:cSld>
@@ -13621,7 +13823,18 @@
                 </a:uFill>
                 <a:latin typeface="Arial Rounded MT Bold" panose="020F0704030504030204" pitchFamily="34" charset="0"/>
               </a:rPr>
-              <a:t>Applicazione pratica</a:t>
+              <a:t>Features </a:t>
+            </a:r>
+            <a:r>
+              <a:rPr lang="en-US" spc="-1" dirty="0">
+                <a:uFill>
+                  <a:solidFill>
+                    <a:srgbClr val="FFFFFF"/>
+                  </a:solidFill>
+                </a:uFill>
+                <a:latin typeface="Arial Rounded MT Bold" panose="020F0704030504030204" pitchFamily="34" charset="0"/>
+              </a:rPr>
+              <a:t>Match</a:t>
             </a:r>
             <a:endParaRPr lang="en-US" dirty="0">
               <a:latin typeface="Arial Rounded MT Bold" panose="020F0704030504030204" pitchFamily="34" charset="0"/>
@@ -13670,7 +13883,7 @@
                 </a:solidFill>
                 <a:latin typeface="Arial Rounded MT Bold" panose="020F0704030504030204" pitchFamily="34" charset="0"/>
               </a:rPr>
-              <a:t>Ho cercato per quanto possibile di portare un’applicazione pratica potenzialmente utile.</a:t>
+              <a:t>Una volta estratte le features da un immagine si possono comparare con le feature di un’altra immagine.</a:t>
             </a:r>
           </a:p>
           <a:p>
@@ -13687,7 +13900,7 @@
                 </a:solidFill>
                 <a:latin typeface="Arial Rounded MT Bold" panose="020F0704030504030204" pitchFamily="34" charset="0"/>
               </a:rPr>
-              <a:t>Il programma riconosce un pattern noto, nel nostro caso la copertina del Fu Mattia Pascal di Italo Svevo. Una volta riconosciuta la copertina, il programma aggiunge informazioni parlando dell’autore, del genere letterario e suggerendo autori o opere simili.</a:t>
+              <a:t>Quando si ha un numero di features «sufficienti si può assumere che l’immagine sia stata trovata.</a:t>
             </a:r>
           </a:p>
           <a:p>
@@ -13697,19 +13910,22 @@
               </a:spcBef>
               <a:buNone/>
             </a:pPr>
-            <a:endParaRPr lang="it-IT" sz="2200" dirty="0">
-              <a:solidFill>
-                <a:schemeClr val="bg1"/>
-              </a:solidFill>
-              <a:latin typeface="Arial Rounded MT Bold" panose="020F0704030504030204" pitchFamily="34" charset="0"/>
-            </a:endParaRPr>
+            <a:r>
+              <a:rPr lang="it-IT" sz="2200" dirty="0">
+                <a:solidFill>
+                  <a:schemeClr val="bg1"/>
+                </a:solidFill>
+                <a:latin typeface="Arial Rounded MT Bold" panose="020F0704030504030204" pitchFamily="34" charset="0"/>
+              </a:rPr>
+              <a:t>Nel mio programma di esempio ho utilizzato SURF in quanto per l’immagine scelta da me era l’unico affidabile. La spiegazione però di questo algoritmo va oltre l’obiettivo di questa presentazione.</a:t>
+            </a:r>
           </a:p>
         </p:txBody>
       </p:sp>
     </p:spTree>
     <p:extLst>
       <p:ext uri="{BB962C8B-B14F-4D97-AF65-F5344CB8AC3E}">
-        <p14:creationId xmlns:p14="http://schemas.microsoft.com/office/powerpoint/2010/main" val="732711071"/>
+        <p14:creationId xmlns:p14="http://schemas.microsoft.com/office/powerpoint/2010/main" val="2934025429"/>
       </p:ext>
     </p:extLst>
   </p:cSld>
@@ -14031,7 +14247,7 @@
                 </a:uFill>
                 <a:latin typeface="Arial Rounded MT Bold" panose="020F0704030504030204" pitchFamily="34" charset="0"/>
               </a:rPr>
-              <a:t>Conclusioni</a:t>
+              <a:t>Applicazione pratica</a:t>
             </a:r>
             <a:endParaRPr lang="en-US" dirty="0">
               <a:latin typeface="Arial Rounded MT Bold" panose="020F0704030504030204" pitchFamily="34" charset="0"/>
@@ -14080,7 +14296,7 @@
                 </a:solidFill>
                 <a:latin typeface="Arial Rounded MT Bold" panose="020F0704030504030204" pitchFamily="34" charset="0"/>
               </a:rPr>
-              <a:t>La diffusione sempre più crescente della realtà aumentata potrebbe modificare il nostro modo di vivere nel medio-breve futuro.</a:t>
+              <a:t>Ho cercato per quanto possibile di portare un’applicazione pratica potenzialmente utile.</a:t>
             </a:r>
           </a:p>
           <a:p>
@@ -14097,7 +14313,7 @@
                 </a:solidFill>
                 <a:latin typeface="Arial Rounded MT Bold" panose="020F0704030504030204" pitchFamily="34" charset="0"/>
               </a:rPr>
-              <a:t>In questa presentazione ho cercato di dare un’idea di come questo futuro possa essere.</a:t>
+              <a:t>I primi due programmi non hanno nessuna finalità pratica se non di supporto ai due successivi programmi.</a:t>
             </a:r>
           </a:p>
           <a:p>
@@ -14114,7 +14330,24 @@
                 </a:solidFill>
                 <a:latin typeface="Arial Rounded MT Bold" panose="020F0704030504030204" pitchFamily="34" charset="0"/>
               </a:rPr>
-              <a:t>Anche per un’applicazione, abbastanza semplice come quella che ho scritto le capacità richieste sono comunque molte: un ottima conoscenza della programmazione, ma anche di analisi matematica, algebra, fisica, letteratura ecc.…. </a:t>
+              <a:t>Ho creato un software per generare dei marcatori con un codice qualunque e di dimensione a piacere.</a:t>
+            </a:r>
+          </a:p>
+          <a:p>
+            <a:pPr marL="0" indent="0">
+              <a:spcBef>
+                <a:spcPts val="1200"/>
+              </a:spcBef>
+              <a:buNone/>
+            </a:pPr>
+            <a:r>
+              <a:rPr lang="it-IT" sz="2200" dirty="0">
+                <a:solidFill>
+                  <a:schemeClr val="bg1"/>
+                </a:solidFill>
+                <a:latin typeface="Arial Rounded MT Bold" panose="020F0704030504030204" pitchFamily="34" charset="0"/>
+              </a:rPr>
+              <a:t>Il secondo programma serve per poter calibrare la telecamera tramite una scacchiera nota.</a:t>
             </a:r>
           </a:p>
         </p:txBody>
@@ -14122,7 +14355,7 @@
     </p:spTree>
     <p:extLst>
       <p:ext uri="{BB962C8B-B14F-4D97-AF65-F5344CB8AC3E}">
-        <p14:creationId xmlns:p14="http://schemas.microsoft.com/office/powerpoint/2010/main" val="2491159197"/>
+        <p14:creationId xmlns:p14="http://schemas.microsoft.com/office/powerpoint/2010/main" val="732711071"/>
       </p:ext>
     </p:extLst>
   </p:cSld>
@@ -14185,7 +14418,7 @@
                 </a:uFill>
                 <a:latin typeface="Arial Rounded MT Bold" panose="020F0704030504030204" pitchFamily="34" charset="0"/>
               </a:rPr>
-              <a:t>Riferimenti</a:t>
+              <a:t>Applicazione pratica</a:t>
             </a:r>
             <a:endParaRPr lang="en-US" dirty="0">
               <a:latin typeface="Arial Rounded MT Bold" panose="020F0704030504030204" pitchFamily="34" charset="0"/>
@@ -14221,190 +14454,97 @@
           </a:bodyPr>
           <a:lstStyle/>
           <a:p>
-            <a:pPr>
-              <a:spcBef>
-                <a:spcPts val="1200"/>
-              </a:spcBef>
-            </a:pPr>
-            <a:r>
-              <a:rPr lang="it-IT" sz="2200" dirty="0">
-                <a:solidFill>
-                  <a:schemeClr val="bg1"/>
-                </a:solidFill>
-                <a:latin typeface="Arial Rounded MT Bold" panose="020F0704030504030204" pitchFamily="34" charset="0"/>
-              </a:rPr>
-              <a:t>Documentazione delle libreria OpenCV: </a:t>
-            </a:r>
-            <a:r>
-              <a:rPr lang="it-IT" sz="2200" dirty="0">
-                <a:solidFill>
-                  <a:schemeClr val="bg1"/>
-                </a:solidFill>
-                <a:latin typeface="Arial Rounded MT Bold" panose="020F0704030504030204" pitchFamily="34" charset="0"/>
-                <a:hlinkClick r:id="rId2"/>
-              </a:rPr>
-              <a:t>http://docs.opencv.org/master/</a:t>
-            </a:r>
-            <a:endParaRPr lang="it-IT" sz="2200" dirty="0">
-              <a:solidFill>
-                <a:schemeClr val="bg1"/>
-              </a:solidFill>
-              <a:latin typeface="Arial Rounded MT Bold" panose="020F0704030504030204" pitchFamily="34" charset="0"/>
-            </a:endParaRPr>
-          </a:p>
-          <a:p>
-            <a:pPr>
-              <a:spcBef>
-                <a:spcPts val="1200"/>
-              </a:spcBef>
-            </a:pPr>
-            <a:r>
-              <a:rPr lang="en-GB" sz="2200" dirty="0">
-                <a:solidFill>
-                  <a:schemeClr val="bg1"/>
-                </a:solidFill>
-                <a:latin typeface="Arial Rounded MT Bold" panose="020F0704030504030204" pitchFamily="34" charset="0"/>
-              </a:rPr>
-              <a:t>Mastering OpenCV with Practical Computer Vision Projects di Daniel </a:t>
-            </a:r>
-            <a:r>
-              <a:rPr lang="en-GB" sz="2200" dirty="0" err="1">
-                <a:solidFill>
-                  <a:schemeClr val="bg1"/>
-                </a:solidFill>
-                <a:latin typeface="Arial Rounded MT Bold" panose="020F0704030504030204" pitchFamily="34" charset="0"/>
-              </a:rPr>
-              <a:t>Lélis</a:t>
-            </a:r>
-            <a:r>
-              <a:rPr lang="en-GB" sz="2200" dirty="0">
-                <a:solidFill>
-                  <a:schemeClr val="bg1"/>
-                </a:solidFill>
-                <a:latin typeface="Arial Rounded MT Bold" panose="020F0704030504030204" pitchFamily="34" charset="0"/>
-              </a:rPr>
-              <a:t> Baggio et al.</a:t>
-            </a:r>
-          </a:p>
-          <a:p>
-            <a:pPr>
-              <a:spcBef>
-                <a:spcPts val="1200"/>
-              </a:spcBef>
-            </a:pPr>
-            <a:r>
-              <a:rPr lang="en-GB" sz="2200" dirty="0">
-                <a:solidFill>
-                  <a:schemeClr val="bg1"/>
-                </a:solidFill>
-                <a:latin typeface="Arial Rounded MT Bold" panose="020F0704030504030204" pitchFamily="34" charset="0"/>
-              </a:rPr>
-              <a:t>Slide del </a:t>
-            </a:r>
-            <a:r>
-              <a:rPr lang="it-IT" sz="2200" dirty="0">
-                <a:solidFill>
-                  <a:schemeClr val="bg1"/>
-                </a:solidFill>
-                <a:latin typeface="Arial Rounded MT Bold" panose="020F0704030504030204" pitchFamily="34" charset="0"/>
-              </a:rPr>
-              <a:t>corso</a:t>
-            </a:r>
-            <a:r>
-              <a:rPr lang="en-GB" sz="2200" dirty="0">
-                <a:solidFill>
-                  <a:schemeClr val="bg1"/>
-                </a:solidFill>
-                <a:latin typeface="Arial Rounded MT Bold" panose="020F0704030504030204" pitchFamily="34" charset="0"/>
-              </a:rPr>
-              <a:t> di Computer Vision </a:t>
-            </a:r>
-            <a:r>
-              <a:rPr lang="it-IT" sz="2200" dirty="0">
-                <a:solidFill>
-                  <a:schemeClr val="bg1"/>
-                </a:solidFill>
-                <a:latin typeface="Arial Rounded MT Bold" panose="020F0704030504030204" pitchFamily="34" charset="0"/>
-              </a:rPr>
-              <a:t>che ho </a:t>
-            </a:r>
-            <a:r>
-              <a:rPr lang="it-IT" sz="2200" dirty="0" err="1">
-                <a:solidFill>
-                  <a:schemeClr val="bg1"/>
-                </a:solidFill>
-                <a:latin typeface="Arial Rounded MT Bold" panose="020F0704030504030204" pitchFamily="34" charset="0"/>
-              </a:rPr>
-              <a:t>freqentato</a:t>
-            </a:r>
-            <a:r>
-              <a:rPr lang="it-IT" sz="2200" dirty="0">
-                <a:solidFill>
-                  <a:schemeClr val="bg1"/>
-                </a:solidFill>
-                <a:latin typeface="Arial Rounded MT Bold" panose="020F0704030504030204" pitchFamily="34" charset="0"/>
-              </a:rPr>
-              <a:t> </a:t>
-            </a:r>
-            <a:r>
-              <a:rPr lang="en-GB" sz="2200" dirty="0">
-                <a:solidFill>
-                  <a:schemeClr val="bg1"/>
-                </a:solidFill>
-                <a:latin typeface="Arial Rounded MT Bold" panose="020F0704030504030204" pitchFamily="34" charset="0"/>
-              </a:rPr>
-              <a:t>al T3Lab.</a:t>
-            </a:r>
-            <a:endParaRPr lang="it-IT" sz="2200" dirty="0">
-              <a:solidFill>
-                <a:schemeClr val="bg1"/>
-              </a:solidFill>
-              <a:latin typeface="Arial Rounded MT Bold" panose="020F0704030504030204" pitchFamily="34" charset="0"/>
-            </a:endParaRPr>
-          </a:p>
-          <a:p>
-            <a:pPr>
-              <a:spcBef>
-                <a:spcPts val="1200"/>
-              </a:spcBef>
-            </a:pPr>
-            <a:r>
-              <a:rPr lang="en-GB" sz="2200" dirty="0">
-                <a:solidFill>
-                  <a:schemeClr val="bg1"/>
-                </a:solidFill>
-                <a:latin typeface="Arial Rounded MT Bold" panose="020F0704030504030204" pitchFamily="34" charset="0"/>
-                <a:hlinkClick r:id="rId3"/>
-              </a:rPr>
-              <a:t>https://it.mathworks.com/help/vision/ug/camera-calibration.html</a:t>
-            </a:r>
-            <a:endParaRPr lang="en-GB" sz="2200" dirty="0">
-              <a:solidFill>
-                <a:schemeClr val="bg1"/>
-              </a:solidFill>
-              <a:latin typeface="Arial Rounded MT Bold" panose="020F0704030504030204" pitchFamily="34" charset="0"/>
-            </a:endParaRPr>
-          </a:p>
-          <a:p>
             <a:pPr marL="0" indent="0">
               <a:spcBef>
                 <a:spcPts val="1200"/>
               </a:spcBef>
               <a:buNone/>
             </a:pPr>
-            <a:endParaRPr lang="en-GB" sz="2200" dirty="0">
-              <a:solidFill>
-                <a:schemeClr val="bg1"/>
-              </a:solidFill>
-              <a:latin typeface="Arial Rounded MT Bold" panose="020F0704030504030204" pitchFamily="34" charset="0"/>
-            </a:endParaRPr>
+            <a:r>
+              <a:rPr lang="it-IT" sz="2200" dirty="0">
+                <a:solidFill>
+                  <a:schemeClr val="bg1"/>
+                </a:solidFill>
+                <a:latin typeface="Arial Rounded MT Bold" panose="020F0704030504030204" pitchFamily="34" charset="0"/>
+              </a:rPr>
+              <a:t>La terza applicazione è rimasta incompiuta data la difficolta, doveva essere un esempio di AR in cui è applicato il Guernica di Pablo Picasso sopra al marcatore.</a:t>
+            </a:r>
+          </a:p>
+          <a:p>
+            <a:pPr marL="0" indent="0">
+              <a:spcBef>
+                <a:spcPts val="1200"/>
+              </a:spcBef>
+              <a:buNone/>
+            </a:pPr>
+            <a:r>
+              <a:rPr lang="it-IT" sz="2200" dirty="0">
+                <a:solidFill>
+                  <a:schemeClr val="bg1"/>
+                </a:solidFill>
+                <a:latin typeface="Arial Rounded MT Bold" panose="020F0704030504030204" pitchFamily="34" charset="0"/>
+              </a:rPr>
+              <a:t>Immaginavo un utilizzo pratico ad esempio nelle scuole per l’apprendimento della storia dell’arte oppure nei musei per poter vedere da vicino i dettagli di un’opera d’arte o semplice come arredamento di interni e/o esterni.</a:t>
+            </a:r>
+          </a:p>
+          <a:p>
+            <a:pPr marL="0" indent="0">
+              <a:spcBef>
+                <a:spcPts val="1200"/>
+              </a:spcBef>
+              <a:buNone/>
+            </a:pPr>
+            <a:r>
+              <a:rPr lang="it-IT" sz="2200" dirty="0">
+                <a:solidFill>
+                  <a:schemeClr val="bg1"/>
+                </a:solidFill>
+                <a:latin typeface="Arial Rounded MT Bold" panose="020F0704030504030204" pitchFamily="34" charset="0"/>
+              </a:rPr>
+              <a:t>La complessità è dovuta principalmente alla ricreazione di un mondo virtuale all’interno del mondo reale: posizione camera, </a:t>
+            </a:r>
+            <a:r>
+              <a:rPr lang="it-IT" sz="2200" dirty="0" err="1">
+                <a:solidFill>
+                  <a:schemeClr val="bg1"/>
+                </a:solidFill>
+                <a:latin typeface="Arial Rounded MT Bold" panose="020F0704030504030204" pitchFamily="34" charset="0"/>
+              </a:rPr>
+              <a:t>shader</a:t>
+            </a:r>
+            <a:r>
+              <a:rPr lang="it-IT" sz="2200" dirty="0">
+                <a:solidFill>
+                  <a:schemeClr val="bg1"/>
+                </a:solidFill>
+                <a:latin typeface="Arial Rounded MT Bold" panose="020F0704030504030204" pitchFamily="34" charset="0"/>
+              </a:rPr>
+              <a:t> dei programmi che girano sulla GPU, illuminazione della scena, ecc.</a:t>
+            </a:r>
+          </a:p>
+          <a:p>
+            <a:pPr marL="0" indent="0">
+              <a:spcBef>
+                <a:spcPts val="1200"/>
+              </a:spcBef>
+              <a:buNone/>
+            </a:pPr>
+            <a:r>
+              <a:rPr lang="it-IT" sz="2200" dirty="0">
+                <a:solidFill>
+                  <a:schemeClr val="bg1"/>
+                </a:solidFill>
+                <a:latin typeface="Arial Rounded MT Bold" panose="020F0704030504030204" pitchFamily="34" charset="0"/>
+              </a:rPr>
+              <a:t>Per semplicità ho quindi posizionato un semplice cubo sopra al marcatore in modo da poter evidenziare comunque tutti i punti discussi durante la presentazione.</a:t>
+            </a:r>
           </a:p>
         </p:txBody>
       </p:sp>
     </p:spTree>
     <p:extLst>
       <p:ext uri="{BB962C8B-B14F-4D97-AF65-F5344CB8AC3E}">
-        <p14:creationId xmlns:p14="http://schemas.microsoft.com/office/powerpoint/2010/main" val="4217852188"/>
+        <p14:creationId xmlns:p14="http://schemas.microsoft.com/office/powerpoint/2010/main" val="900137622"/>
       </p:ext>
     </p:extLst>
   </p:cSld>
@@ -14467,7 +14607,7 @@
                 </a:uFill>
                 <a:latin typeface="Arial Rounded MT Bold" panose="020F0704030504030204" pitchFamily="34" charset="0"/>
               </a:rPr>
-              <a:t>Ringraziamenti</a:t>
+              <a:t>Applicazione pratica</a:t>
             </a:r>
             <a:endParaRPr lang="en-US" dirty="0">
               <a:latin typeface="Arial Rounded MT Bold" panose="020F0704030504030204" pitchFamily="34" charset="0"/>
@@ -14516,7 +14656,628 @@
                 </a:solidFill>
                 <a:latin typeface="Arial Rounded MT Bold" panose="020F0704030504030204" pitchFamily="34" charset="0"/>
               </a:rPr>
-              <a:t>Un ringraziamento fortissimo ad Alice che ha dovuto sopportare la mia ansia e la mia frustrazione negli ultimi mesi.</a:t>
+              <a:t>L’ultimo programma riconosce un pattern noto, nel nostro caso la copertina del Fu Mattia Pascal di Italo Svevo.</a:t>
+            </a:r>
+          </a:p>
+          <a:p>
+            <a:pPr marL="0" indent="0">
+              <a:spcBef>
+                <a:spcPts val="1200"/>
+              </a:spcBef>
+              <a:buNone/>
+            </a:pPr>
+            <a:r>
+              <a:rPr lang="it-IT" sz="2200" dirty="0">
+                <a:solidFill>
+                  <a:schemeClr val="bg1"/>
+                </a:solidFill>
+                <a:latin typeface="Arial Rounded MT Bold" panose="020F0704030504030204" pitchFamily="34" charset="0"/>
+              </a:rPr>
+              <a:t>Una volta riconosciuta la copertina, il programma aggiunge informazioni parlando dell’autore, del genere letterario e suggerendo autori o opere simili.</a:t>
+            </a:r>
+          </a:p>
+          <a:p>
+            <a:pPr marL="0" indent="0">
+              <a:spcBef>
+                <a:spcPts val="1200"/>
+              </a:spcBef>
+              <a:buNone/>
+            </a:pPr>
+            <a:r>
+              <a:rPr lang="it-IT" sz="2200" dirty="0">
+                <a:solidFill>
+                  <a:schemeClr val="bg1"/>
+                </a:solidFill>
+                <a:latin typeface="Arial Rounded MT Bold" panose="020F0704030504030204" pitchFamily="34" charset="0"/>
+              </a:rPr>
+              <a:t>L’applicazione pratica più vicina potrebbe essere quella di una libreria in cui è possibile avere delle informazioni aggiuntive su di un opera e che comunque inciti all’acquisto di una determinata opera.</a:t>
+            </a:r>
+          </a:p>
+          <a:p>
+            <a:pPr marL="0" indent="0">
+              <a:spcBef>
+                <a:spcPts val="1200"/>
+              </a:spcBef>
+              <a:buNone/>
+            </a:pPr>
+            <a:endParaRPr lang="it-IT" sz="2200" dirty="0">
+              <a:solidFill>
+                <a:schemeClr val="bg1"/>
+              </a:solidFill>
+              <a:latin typeface="Arial Rounded MT Bold" panose="020F0704030504030204" pitchFamily="34" charset="0"/>
+            </a:endParaRPr>
+          </a:p>
+        </p:txBody>
+      </p:sp>
+    </p:spTree>
+    <p:extLst>
+      <p:ext uri="{BB962C8B-B14F-4D97-AF65-F5344CB8AC3E}">
+        <p14:creationId xmlns:p14="http://schemas.microsoft.com/office/powerpoint/2010/main" val="902691732"/>
+      </p:ext>
+    </p:extLst>
+  </p:cSld>
+  <p:clrMapOvr>
+    <a:masterClrMapping/>
+  </p:clrMapOvr>
+</p:sld>
+</file>
+
+<file path=ppt/slides/slide33.xml><?xml version="1.0" encoding="utf-8"?>
+<p:sld xmlns:a="http://schemas.openxmlformats.org/drawingml/2006/main" xmlns:r="http://schemas.openxmlformats.org/officeDocument/2006/relationships" xmlns:p="http://schemas.openxmlformats.org/presentationml/2006/main">
+  <p:cSld>
+    <p:spTree>
+      <p:nvGrpSpPr>
+        <p:cNvPr id="1" name=""/>
+        <p:cNvGrpSpPr/>
+        <p:nvPr/>
+      </p:nvGrpSpPr>
+      <p:grpSpPr>
+        <a:xfrm>
+          <a:off x="0" y="0"/>
+          <a:ext cx="0" cy="0"/>
+          <a:chOff x="0" y="0"/>
+          <a:chExt cx="0" cy="0"/>
+        </a:xfrm>
+      </p:grpSpPr>
+      <p:sp>
+        <p:nvSpPr>
+          <p:cNvPr id="7" name="Titolo 6">
+            <a:extLst>
+              <a:ext uri="{FF2B5EF4-FFF2-40B4-BE49-F238E27FC236}">
+                <a16:creationId xmlns:a16="http://schemas.microsoft.com/office/drawing/2014/main" id="{C16E6962-1B7B-4389-81F2-F4D60E008C63}"/>
+              </a:ext>
+            </a:extLst>
+          </p:cNvPr>
+          <p:cNvSpPr>
+            <a:spLocks noGrp="1"/>
+          </p:cNvSpPr>
+          <p:nvPr>
+            <p:ph type="title"/>
+          </p:nvPr>
+        </p:nvSpPr>
+        <p:spPr>
+          <a:xfrm>
+            <a:off x="0" y="0"/>
+            <a:ext cx="12192000" cy="2386800"/>
+          </a:xfrm>
+        </p:spPr>
+        <p:txBody>
+          <a:bodyPr/>
+          <a:lstStyle/>
+          <a:p>
+            <a:pPr algn="ctr"/>
+            <a:r>
+              <a:rPr lang="it-IT" spc="-1" dirty="0">
+                <a:uFill>
+                  <a:solidFill>
+                    <a:srgbClr val="FFFFFF"/>
+                  </a:solidFill>
+                </a:uFill>
+                <a:latin typeface="Arial Rounded MT Bold" panose="020F0704030504030204" pitchFamily="34" charset="0"/>
+              </a:rPr>
+              <a:t>Conclusioni</a:t>
+            </a:r>
+            <a:endParaRPr lang="en-US" dirty="0">
+              <a:latin typeface="Arial Rounded MT Bold" panose="020F0704030504030204" pitchFamily="34" charset="0"/>
+            </a:endParaRPr>
+          </a:p>
+        </p:txBody>
+      </p:sp>
+      <p:sp>
+        <p:nvSpPr>
+          <p:cNvPr id="8" name="Segnaposto testo 7">
+            <a:extLst>
+              <a:ext uri="{FF2B5EF4-FFF2-40B4-BE49-F238E27FC236}">
+                <a16:creationId xmlns:a16="http://schemas.microsoft.com/office/drawing/2014/main" id="{1DE4F4F2-B148-48F9-A3B2-A119636CB3EC}"/>
+              </a:ext>
+            </a:extLst>
+          </p:cNvPr>
+          <p:cNvSpPr>
+            <a:spLocks noGrp="1"/>
+          </p:cNvSpPr>
+          <p:nvPr>
+            <p:ph idx="1"/>
+          </p:nvPr>
+        </p:nvSpPr>
+        <p:spPr>
+          <a:xfrm>
+            <a:off x="609480" y="1727999"/>
+            <a:ext cx="10972080" cy="5130001"/>
+          </a:xfrm>
+        </p:spPr>
+        <p:txBody>
+          <a:bodyPr anchor="t">
+            <a:noAutofit/>
+          </a:bodyPr>
+          <a:lstStyle/>
+          <a:p>
+            <a:pPr marL="0" indent="0">
+              <a:spcBef>
+                <a:spcPts val="1200"/>
+              </a:spcBef>
+              <a:buNone/>
+            </a:pPr>
+            <a:r>
+              <a:rPr lang="it-IT" sz="2200" dirty="0">
+                <a:solidFill>
+                  <a:schemeClr val="bg1"/>
+                </a:solidFill>
+                <a:latin typeface="Arial Rounded MT Bold" panose="020F0704030504030204" pitchFamily="34" charset="0"/>
+              </a:rPr>
+              <a:t>La diffusione sempre più crescente della realtà aumentata potrebbe modificare il nostro modo di vivere nel medio-breve futuro.</a:t>
+            </a:r>
+          </a:p>
+          <a:p>
+            <a:pPr marL="0" indent="0">
+              <a:spcBef>
+                <a:spcPts val="1200"/>
+              </a:spcBef>
+              <a:buNone/>
+            </a:pPr>
+            <a:r>
+              <a:rPr lang="it-IT" sz="2200" dirty="0">
+                <a:solidFill>
+                  <a:schemeClr val="bg1"/>
+                </a:solidFill>
+                <a:latin typeface="Arial Rounded MT Bold" panose="020F0704030504030204" pitchFamily="34" charset="0"/>
+              </a:rPr>
+              <a:t>In questa presentazione ho cercato di dare un’idea di come questo futuro possa essere.</a:t>
+            </a:r>
+          </a:p>
+          <a:p>
+            <a:pPr marL="0" indent="0">
+              <a:spcBef>
+                <a:spcPts val="1200"/>
+              </a:spcBef>
+              <a:buNone/>
+            </a:pPr>
+            <a:r>
+              <a:rPr lang="it-IT" sz="2200" dirty="0">
+                <a:solidFill>
+                  <a:schemeClr val="bg1"/>
+                </a:solidFill>
+                <a:latin typeface="Arial Rounded MT Bold" panose="020F0704030504030204" pitchFamily="34" charset="0"/>
+              </a:rPr>
+              <a:t>Anche per un’applicazione, abbastanza semplice come quella che ho scritto le capacità richieste sono comunque molte: un ottima conoscenza della programmazione, ma anche di analisi matematica, algebra, fisica, letteratura ecc.…. </a:t>
+            </a:r>
+          </a:p>
+        </p:txBody>
+      </p:sp>
+    </p:spTree>
+    <p:extLst>
+      <p:ext uri="{BB962C8B-B14F-4D97-AF65-F5344CB8AC3E}">
+        <p14:creationId xmlns:p14="http://schemas.microsoft.com/office/powerpoint/2010/main" val="2491159197"/>
+      </p:ext>
+    </p:extLst>
+  </p:cSld>
+  <p:clrMapOvr>
+    <a:masterClrMapping/>
+  </p:clrMapOvr>
+</p:sld>
+</file>
+
+<file path=ppt/slides/slide34.xml><?xml version="1.0" encoding="utf-8"?>
+<p:sld xmlns:a="http://schemas.openxmlformats.org/drawingml/2006/main" xmlns:r="http://schemas.openxmlformats.org/officeDocument/2006/relationships" xmlns:p="http://schemas.openxmlformats.org/presentationml/2006/main">
+  <p:cSld>
+    <p:spTree>
+      <p:nvGrpSpPr>
+        <p:cNvPr id="1" name=""/>
+        <p:cNvGrpSpPr/>
+        <p:nvPr/>
+      </p:nvGrpSpPr>
+      <p:grpSpPr>
+        <a:xfrm>
+          <a:off x="0" y="0"/>
+          <a:ext cx="0" cy="0"/>
+          <a:chOff x="0" y="0"/>
+          <a:chExt cx="0" cy="0"/>
+        </a:xfrm>
+      </p:grpSpPr>
+      <p:sp>
+        <p:nvSpPr>
+          <p:cNvPr id="7" name="Titolo 6">
+            <a:extLst>
+              <a:ext uri="{FF2B5EF4-FFF2-40B4-BE49-F238E27FC236}">
+                <a16:creationId xmlns:a16="http://schemas.microsoft.com/office/drawing/2014/main" id="{C16E6962-1B7B-4389-81F2-F4D60E008C63}"/>
+              </a:ext>
+            </a:extLst>
+          </p:cNvPr>
+          <p:cNvSpPr>
+            <a:spLocks noGrp="1"/>
+          </p:cNvSpPr>
+          <p:nvPr>
+            <p:ph type="title"/>
+          </p:nvPr>
+        </p:nvSpPr>
+        <p:spPr>
+          <a:xfrm>
+            <a:off x="0" y="0"/>
+            <a:ext cx="12192000" cy="2386800"/>
+          </a:xfrm>
+        </p:spPr>
+        <p:txBody>
+          <a:bodyPr/>
+          <a:lstStyle/>
+          <a:p>
+            <a:pPr algn="ctr"/>
+            <a:r>
+              <a:rPr lang="it-IT" spc="-1" dirty="0">
+                <a:uFill>
+                  <a:solidFill>
+                    <a:srgbClr val="FFFFFF"/>
+                  </a:solidFill>
+                </a:uFill>
+                <a:latin typeface="Arial Rounded MT Bold" panose="020F0704030504030204" pitchFamily="34" charset="0"/>
+              </a:rPr>
+              <a:t>Riferimenti</a:t>
+            </a:r>
+            <a:endParaRPr lang="en-US" dirty="0">
+              <a:latin typeface="Arial Rounded MT Bold" panose="020F0704030504030204" pitchFamily="34" charset="0"/>
+            </a:endParaRPr>
+          </a:p>
+        </p:txBody>
+      </p:sp>
+      <p:sp>
+        <p:nvSpPr>
+          <p:cNvPr id="8" name="Segnaposto testo 7">
+            <a:extLst>
+              <a:ext uri="{FF2B5EF4-FFF2-40B4-BE49-F238E27FC236}">
+                <a16:creationId xmlns:a16="http://schemas.microsoft.com/office/drawing/2014/main" id="{1DE4F4F2-B148-48F9-A3B2-A119636CB3EC}"/>
+              </a:ext>
+            </a:extLst>
+          </p:cNvPr>
+          <p:cNvSpPr>
+            <a:spLocks noGrp="1"/>
+          </p:cNvSpPr>
+          <p:nvPr>
+            <p:ph idx="1"/>
+          </p:nvPr>
+        </p:nvSpPr>
+        <p:spPr>
+          <a:xfrm>
+            <a:off x="609480" y="1727999"/>
+            <a:ext cx="10972080" cy="5130001"/>
+          </a:xfrm>
+        </p:spPr>
+        <p:txBody>
+          <a:bodyPr anchor="t">
+            <a:noAutofit/>
+          </a:bodyPr>
+          <a:lstStyle/>
+          <a:p>
+            <a:pPr>
+              <a:spcBef>
+                <a:spcPts val="1200"/>
+              </a:spcBef>
+            </a:pPr>
+            <a:r>
+              <a:rPr lang="it-IT" sz="2200" dirty="0">
+                <a:solidFill>
+                  <a:schemeClr val="bg1"/>
+                </a:solidFill>
+                <a:latin typeface="Arial Rounded MT Bold" panose="020F0704030504030204" pitchFamily="34" charset="0"/>
+              </a:rPr>
+              <a:t>Documentazione delle libreria OpenCV: </a:t>
+            </a:r>
+            <a:r>
+              <a:rPr lang="it-IT" sz="2200" dirty="0">
+                <a:solidFill>
+                  <a:schemeClr val="bg1"/>
+                </a:solidFill>
+                <a:latin typeface="Arial Rounded MT Bold" panose="020F0704030504030204" pitchFamily="34" charset="0"/>
+                <a:hlinkClick r:id="rId2"/>
+              </a:rPr>
+              <a:t>http://docs.opencv.org/master/</a:t>
+            </a:r>
+            <a:endParaRPr lang="it-IT" sz="2200" dirty="0">
+              <a:solidFill>
+                <a:schemeClr val="bg1"/>
+              </a:solidFill>
+              <a:latin typeface="Arial Rounded MT Bold" panose="020F0704030504030204" pitchFamily="34" charset="0"/>
+            </a:endParaRPr>
+          </a:p>
+          <a:p>
+            <a:pPr>
+              <a:spcBef>
+                <a:spcPts val="1200"/>
+              </a:spcBef>
+            </a:pPr>
+            <a:r>
+              <a:rPr lang="en-GB" sz="2200" dirty="0">
+                <a:solidFill>
+                  <a:schemeClr val="bg1"/>
+                </a:solidFill>
+                <a:latin typeface="Arial Rounded MT Bold" panose="020F0704030504030204" pitchFamily="34" charset="0"/>
+              </a:rPr>
+              <a:t>Mastering OpenCV with Practical Computer Vision Projects di Daniel </a:t>
+            </a:r>
+            <a:r>
+              <a:rPr lang="en-GB" sz="2200" dirty="0" err="1">
+                <a:solidFill>
+                  <a:schemeClr val="bg1"/>
+                </a:solidFill>
+                <a:latin typeface="Arial Rounded MT Bold" panose="020F0704030504030204" pitchFamily="34" charset="0"/>
+              </a:rPr>
+              <a:t>Lélis</a:t>
+            </a:r>
+            <a:r>
+              <a:rPr lang="en-GB" sz="2200" dirty="0">
+                <a:solidFill>
+                  <a:schemeClr val="bg1"/>
+                </a:solidFill>
+                <a:latin typeface="Arial Rounded MT Bold" panose="020F0704030504030204" pitchFamily="34" charset="0"/>
+              </a:rPr>
+              <a:t> Baggio et al.</a:t>
+            </a:r>
+          </a:p>
+          <a:p>
+            <a:pPr>
+              <a:spcBef>
+                <a:spcPts val="1200"/>
+              </a:spcBef>
+            </a:pPr>
+            <a:r>
+              <a:rPr lang="en-GB" sz="2200" dirty="0">
+                <a:solidFill>
+                  <a:schemeClr val="bg1"/>
+                </a:solidFill>
+                <a:latin typeface="Arial Rounded MT Bold" panose="020F0704030504030204" pitchFamily="34" charset="0"/>
+              </a:rPr>
+              <a:t>Slide del </a:t>
+            </a:r>
+            <a:r>
+              <a:rPr lang="it-IT" sz="2200" dirty="0">
+                <a:solidFill>
+                  <a:schemeClr val="bg1"/>
+                </a:solidFill>
+                <a:latin typeface="Arial Rounded MT Bold" panose="020F0704030504030204" pitchFamily="34" charset="0"/>
+              </a:rPr>
+              <a:t>corso</a:t>
+            </a:r>
+            <a:r>
+              <a:rPr lang="en-GB" sz="2200" dirty="0">
+                <a:solidFill>
+                  <a:schemeClr val="bg1"/>
+                </a:solidFill>
+                <a:latin typeface="Arial Rounded MT Bold" panose="020F0704030504030204" pitchFamily="34" charset="0"/>
+              </a:rPr>
+              <a:t> di Computer Vision </a:t>
+            </a:r>
+            <a:r>
+              <a:rPr lang="it-IT" sz="2200" dirty="0">
+                <a:solidFill>
+                  <a:schemeClr val="bg1"/>
+                </a:solidFill>
+                <a:latin typeface="Arial Rounded MT Bold" panose="020F0704030504030204" pitchFamily="34" charset="0"/>
+              </a:rPr>
+              <a:t>che ho </a:t>
+            </a:r>
+            <a:r>
+              <a:rPr lang="it-IT" sz="2200" dirty="0" err="1">
+                <a:solidFill>
+                  <a:schemeClr val="bg1"/>
+                </a:solidFill>
+                <a:latin typeface="Arial Rounded MT Bold" panose="020F0704030504030204" pitchFamily="34" charset="0"/>
+              </a:rPr>
+              <a:t>freqentato</a:t>
+            </a:r>
+            <a:r>
+              <a:rPr lang="it-IT" sz="2200" dirty="0">
+                <a:solidFill>
+                  <a:schemeClr val="bg1"/>
+                </a:solidFill>
+                <a:latin typeface="Arial Rounded MT Bold" panose="020F0704030504030204" pitchFamily="34" charset="0"/>
+              </a:rPr>
+              <a:t> </a:t>
+            </a:r>
+            <a:r>
+              <a:rPr lang="en-GB" sz="2200" dirty="0">
+                <a:solidFill>
+                  <a:schemeClr val="bg1"/>
+                </a:solidFill>
+                <a:latin typeface="Arial Rounded MT Bold" panose="020F0704030504030204" pitchFamily="34" charset="0"/>
+              </a:rPr>
+              <a:t>al T3Lab.</a:t>
+            </a:r>
+            <a:endParaRPr lang="it-IT" sz="2200" dirty="0">
+              <a:solidFill>
+                <a:schemeClr val="bg1"/>
+              </a:solidFill>
+              <a:latin typeface="Arial Rounded MT Bold" panose="020F0704030504030204" pitchFamily="34" charset="0"/>
+            </a:endParaRPr>
+          </a:p>
+          <a:p>
+            <a:pPr>
+              <a:spcBef>
+                <a:spcPts val="1200"/>
+              </a:spcBef>
+            </a:pPr>
+            <a:r>
+              <a:rPr lang="en-GB" sz="2200" dirty="0">
+                <a:solidFill>
+                  <a:schemeClr val="bg1"/>
+                </a:solidFill>
+                <a:latin typeface="Arial Rounded MT Bold" panose="020F0704030504030204" pitchFamily="34" charset="0"/>
+                <a:hlinkClick r:id="rId3"/>
+              </a:rPr>
+              <a:t>https://it.mathworks.com/help/vision/ug/camera-calibration.html</a:t>
+            </a:r>
+            <a:endParaRPr lang="en-GB" sz="2200" dirty="0">
+              <a:solidFill>
+                <a:schemeClr val="bg1"/>
+              </a:solidFill>
+              <a:latin typeface="Arial Rounded MT Bold" panose="020F0704030504030204" pitchFamily="34" charset="0"/>
+            </a:endParaRPr>
+          </a:p>
+          <a:p>
+            <a:pPr marL="0" indent="0">
+              <a:spcBef>
+                <a:spcPts val="1200"/>
+              </a:spcBef>
+              <a:buNone/>
+            </a:pPr>
+            <a:endParaRPr lang="en-GB" sz="2200" dirty="0">
+              <a:solidFill>
+                <a:schemeClr val="bg1"/>
+              </a:solidFill>
+              <a:latin typeface="Arial Rounded MT Bold" panose="020F0704030504030204" pitchFamily="34" charset="0"/>
+            </a:endParaRPr>
+          </a:p>
+        </p:txBody>
+      </p:sp>
+    </p:spTree>
+    <p:extLst>
+      <p:ext uri="{BB962C8B-B14F-4D97-AF65-F5344CB8AC3E}">
+        <p14:creationId xmlns:p14="http://schemas.microsoft.com/office/powerpoint/2010/main" val="4217852188"/>
+      </p:ext>
+    </p:extLst>
+  </p:cSld>
+  <p:clrMapOvr>
+    <a:masterClrMapping/>
+  </p:clrMapOvr>
+</p:sld>
+</file>
+
+<file path=ppt/slides/slide35.xml><?xml version="1.0" encoding="utf-8"?>
+<p:sld xmlns:a="http://schemas.openxmlformats.org/drawingml/2006/main" xmlns:r="http://schemas.openxmlformats.org/officeDocument/2006/relationships" xmlns:p="http://schemas.openxmlformats.org/presentationml/2006/main">
+  <p:cSld>
+    <p:spTree>
+      <p:nvGrpSpPr>
+        <p:cNvPr id="1" name=""/>
+        <p:cNvGrpSpPr/>
+        <p:nvPr/>
+      </p:nvGrpSpPr>
+      <p:grpSpPr>
+        <a:xfrm>
+          <a:off x="0" y="0"/>
+          <a:ext cx="0" cy="0"/>
+          <a:chOff x="0" y="0"/>
+          <a:chExt cx="0" cy="0"/>
+        </a:xfrm>
+      </p:grpSpPr>
+      <p:sp>
+        <p:nvSpPr>
+          <p:cNvPr id="7" name="Titolo 6">
+            <a:extLst>
+              <a:ext uri="{FF2B5EF4-FFF2-40B4-BE49-F238E27FC236}">
+                <a16:creationId xmlns:a16="http://schemas.microsoft.com/office/drawing/2014/main" id="{C16E6962-1B7B-4389-81F2-F4D60E008C63}"/>
+              </a:ext>
+            </a:extLst>
+          </p:cNvPr>
+          <p:cNvSpPr>
+            <a:spLocks noGrp="1"/>
+          </p:cNvSpPr>
+          <p:nvPr>
+            <p:ph type="title"/>
+          </p:nvPr>
+        </p:nvSpPr>
+        <p:spPr>
+          <a:xfrm>
+            <a:off x="0" y="0"/>
+            <a:ext cx="12192000" cy="2386800"/>
+          </a:xfrm>
+        </p:spPr>
+        <p:txBody>
+          <a:bodyPr/>
+          <a:lstStyle/>
+          <a:p>
+            <a:pPr algn="ctr"/>
+            <a:r>
+              <a:rPr lang="it-IT" spc="-1" dirty="0">
+                <a:uFill>
+                  <a:solidFill>
+                    <a:srgbClr val="FFFFFF"/>
+                  </a:solidFill>
+                </a:uFill>
+                <a:latin typeface="Arial Rounded MT Bold" panose="020F0704030504030204" pitchFamily="34" charset="0"/>
+              </a:rPr>
+              <a:t>Ringraziamenti</a:t>
+            </a:r>
+            <a:endParaRPr lang="en-US" dirty="0">
+              <a:latin typeface="Arial Rounded MT Bold" panose="020F0704030504030204" pitchFamily="34" charset="0"/>
+            </a:endParaRPr>
+          </a:p>
+        </p:txBody>
+      </p:sp>
+      <p:sp>
+        <p:nvSpPr>
+          <p:cNvPr id="8" name="Segnaposto testo 7">
+            <a:extLst>
+              <a:ext uri="{FF2B5EF4-FFF2-40B4-BE49-F238E27FC236}">
+                <a16:creationId xmlns:a16="http://schemas.microsoft.com/office/drawing/2014/main" id="{1DE4F4F2-B148-48F9-A3B2-A119636CB3EC}"/>
+              </a:ext>
+            </a:extLst>
+          </p:cNvPr>
+          <p:cNvSpPr>
+            <a:spLocks noGrp="1"/>
+          </p:cNvSpPr>
+          <p:nvPr>
+            <p:ph idx="1"/>
+          </p:nvPr>
+        </p:nvSpPr>
+        <p:spPr>
+          <a:xfrm>
+            <a:off x="609480" y="1727999"/>
+            <a:ext cx="10972080" cy="5130001"/>
+          </a:xfrm>
+        </p:spPr>
+        <p:txBody>
+          <a:bodyPr anchor="t">
+            <a:noAutofit/>
+          </a:bodyPr>
+          <a:lstStyle/>
+          <a:p>
+            <a:pPr marL="0" indent="0">
+              <a:spcBef>
+                <a:spcPts val="1200"/>
+              </a:spcBef>
+              <a:buNone/>
+            </a:pPr>
+            <a:r>
+              <a:rPr lang="it-IT" sz="2200" dirty="0">
+                <a:solidFill>
+                  <a:schemeClr val="bg1"/>
+                </a:solidFill>
+                <a:latin typeface="Arial Rounded MT Bold" panose="020F0704030504030204" pitchFamily="34" charset="0"/>
+              </a:rPr>
+              <a:t>Un ringraziamento fortissimo ad Alice che ha dovuto sopportare la mia ansia e la mia frustrazione in questi ultimi mesi. </a:t>
+            </a:r>
+          </a:p>
+          <a:p>
+            <a:pPr marL="0" indent="0">
+              <a:spcBef>
+                <a:spcPts val="1200"/>
+              </a:spcBef>
+              <a:buNone/>
+            </a:pPr>
+            <a:r>
+              <a:rPr lang="it-IT" sz="2200" dirty="0">
+                <a:solidFill>
+                  <a:schemeClr val="bg1"/>
+                </a:solidFill>
+                <a:latin typeface="Arial Rounded MT Bold" panose="020F0704030504030204" pitchFamily="34" charset="0"/>
+              </a:rPr>
+              <a:t>Un profondo ringraziamento anche ad Ennio Quattrini, senza il suo supporto ed il suo aiuto probabilmente non sarei cui ora.</a:t>
             </a:r>
           </a:p>
         </p:txBody>
@@ -14525,6 +15286,126 @@
     <p:extLst>
       <p:ext uri="{BB962C8B-B14F-4D97-AF65-F5344CB8AC3E}">
         <p14:creationId xmlns:p14="http://schemas.microsoft.com/office/powerpoint/2010/main" val="3852418968"/>
+      </p:ext>
+    </p:extLst>
+  </p:cSld>
+  <p:clrMapOvr>
+    <a:masterClrMapping/>
+  </p:clrMapOvr>
+</p:sld>
+</file>
+
+<file path=ppt/slides/slide36.xml><?xml version="1.0" encoding="utf-8"?>
+<p:sld xmlns:a="http://schemas.openxmlformats.org/drawingml/2006/main" xmlns:r="http://schemas.openxmlformats.org/officeDocument/2006/relationships" xmlns:p="http://schemas.openxmlformats.org/presentationml/2006/main">
+  <p:cSld>
+    <p:spTree>
+      <p:nvGrpSpPr>
+        <p:cNvPr id="1" name=""/>
+        <p:cNvGrpSpPr/>
+        <p:nvPr/>
+      </p:nvGrpSpPr>
+      <p:grpSpPr>
+        <a:xfrm>
+          <a:off x="0" y="0"/>
+          <a:ext cx="0" cy="0"/>
+          <a:chOff x="0" y="0"/>
+          <a:chExt cx="0" cy="0"/>
+        </a:xfrm>
+      </p:grpSpPr>
+      <p:sp>
+        <p:nvSpPr>
+          <p:cNvPr id="262" name="CustomShape 1"/>
+          <p:cNvSpPr/>
+          <p:nvPr/>
+        </p:nvSpPr>
+        <p:spPr>
+          <a:xfrm>
+            <a:off x="0" y="0"/>
+            <a:ext cx="12192000" cy="6858000"/>
+          </a:xfrm>
+          <a:prstGeom prst="rect">
+            <a:avLst/>
+          </a:prstGeom>
+          <a:noFill/>
+          <a:ln>
+            <a:noFill/>
+          </a:ln>
+        </p:spPr>
+        <p:style>
+          <a:lnRef idx="0">
+            <a:scrgbClr r="0" g="0" b="0"/>
+          </a:lnRef>
+          <a:fillRef idx="0">
+            <a:scrgbClr r="0" g="0" b="0"/>
+          </a:fillRef>
+          <a:effectRef idx="0">
+            <a:scrgbClr r="0" g="0" b="0"/>
+          </a:effectRef>
+          <a:fontRef idx="minor"/>
+        </p:style>
+        <p:txBody>
+          <a:bodyPr lIns="90000" tIns="45000" rIns="90000" bIns="45000" anchor="ctr"/>
+          <a:lstStyle/>
+          <a:p>
+            <a:pPr algn="ctr"/>
+            <a:r>
+              <a:rPr lang="it-IT" sz="9600" b="0" strike="noStrike" spc="-1">
+                <a:uFill>
+                  <a:solidFill>
+                    <a:srgbClr val="FFFFFF"/>
+                  </a:solidFill>
+                </a:uFill>
+                <a:latin typeface="Arial Rounded MT Bold" panose="020F0704030504030204" pitchFamily="34" charset="0"/>
+              </a:rPr>
+              <a:t>GRAZIE</a:t>
+            </a:r>
+            <a:endParaRPr lang="it-IT" sz="9600" b="0" strike="noStrike" spc="-1" dirty="0">
+              <a:uFill>
+                <a:solidFill>
+                  <a:srgbClr val="FFFFFF"/>
+                </a:solidFill>
+              </a:uFill>
+              <a:latin typeface="Arial Rounded MT Bold" panose="020F0704030504030204" pitchFamily="34" charset="0"/>
+            </a:endParaRPr>
+          </a:p>
+        </p:txBody>
+      </p:sp>
+      <p:sp>
+        <p:nvSpPr>
+          <p:cNvPr id="263" name="CustomShape 2"/>
+          <p:cNvSpPr/>
+          <p:nvPr/>
+        </p:nvSpPr>
+        <p:spPr>
+          <a:xfrm>
+            <a:off x="1876320" y="3602160"/>
+            <a:ext cx="8790840" cy="1654920"/>
+          </a:xfrm>
+          <a:prstGeom prst="rect">
+            <a:avLst/>
+          </a:prstGeom>
+          <a:noFill/>
+          <a:ln>
+            <a:noFill/>
+          </a:ln>
+        </p:spPr>
+        <p:style>
+          <a:lnRef idx="0">
+            <a:scrgbClr r="0" g="0" b="0"/>
+          </a:lnRef>
+          <a:fillRef idx="0">
+            <a:scrgbClr r="0" g="0" b="0"/>
+          </a:fillRef>
+          <a:effectRef idx="0">
+            <a:scrgbClr r="0" g="0" b="0"/>
+          </a:effectRef>
+          <a:fontRef idx="minor"/>
+        </p:style>
+      </p:sp>
+    </p:spTree>
+    <p:extLst>
+      <p:ext uri="{BB962C8B-B14F-4D97-AF65-F5344CB8AC3E}">
+        <p14:creationId xmlns:p14="http://schemas.microsoft.com/office/powerpoint/2010/main" val="4167667811"/>
       </p:ext>
     </p:extLst>
   </p:cSld>

</xml_diff>

<commit_message>
Fine tesinagit add presentazione/Tesina\ Elvis.pptx !
</commit_message>
<xml_diff>
--- a/presentazione/Tesina Elvis.pptx
+++ b/presentazione/Tesina Elvis.pptx
@@ -48,7 +48,7 @@
     <p:sldId id="298" r:id="rId39"/>
   </p:sldIdLst>
   <p:sldSz cx="12192000" cy="6858000"/>
-  <p:notesSz cx="7559675" cy="10691813"/>
+  <p:notesSz cx="6797675" cy="9926638"/>
   <p:defaultTextStyle>
     <a:defPPr>
       <a:defRPr lang="en-US"/>
@@ -163,6 +163,10 @@
 </p:presentation>
 </file>
 
+<file path=ppt/revisionInfo.xml><?xml version="1.0" encoding="utf-8"?>
+<p1510:revInfo xmlns:a="http://schemas.openxmlformats.org/drawingml/2006/main" xmlns:r="http://schemas.openxmlformats.org/officeDocument/2006/relationships" xmlns:p1510="http://schemas.microsoft.com/office/powerpoint/2015/10/main"/>
+</file>
+
 <file path=ppt/notesMasters/notesMaster1.xml><?xml version="1.0" encoding="utf-8"?>
 <p:notesMaster xmlns:a="http://schemas.openxmlformats.org/drawingml/2006/main" xmlns:r="http://schemas.openxmlformats.org/officeDocument/2006/relationships" xmlns:p="http://schemas.openxmlformats.org/presentationml/2006/main">
   <p:cSld>
@@ -197,18 +201,18 @@
         </p:nvSpPr>
         <p:spPr>
           <a:xfrm>
-            <a:off x="0" y="0"/>
-            <a:ext cx="3276600" cy="536575"/>
+            <a:off x="0" y="1"/>
+            <a:ext cx="2946325" cy="498174"/>
           </a:xfrm>
           <a:prstGeom prst="rect">
             <a:avLst/>
           </a:prstGeom>
         </p:spPr>
         <p:txBody>
-          <a:bodyPr vert="horz" lIns="91440" tIns="45720" rIns="91440" bIns="45720" rtlCol="0"/>
+          <a:bodyPr vert="horz" lIns="83786" tIns="41893" rIns="83786" bIns="41893" rtlCol="0"/>
           <a:lstStyle>
             <a:lvl1pPr algn="l">
-              <a:defRPr sz="1200"/>
+              <a:defRPr sz="1100"/>
             </a:lvl1pPr>
           </a:lstStyle>
           <a:p>
@@ -228,24 +232,24 @@
         </p:nvSpPr>
         <p:spPr>
           <a:xfrm>
-            <a:off x="4281488" y="0"/>
-            <a:ext cx="3276600" cy="536575"/>
+            <a:off x="3849923" y="1"/>
+            <a:ext cx="2946325" cy="498174"/>
           </a:xfrm>
           <a:prstGeom prst="rect">
             <a:avLst/>
           </a:prstGeom>
         </p:spPr>
         <p:txBody>
-          <a:bodyPr vert="horz" lIns="91440" tIns="45720" rIns="91440" bIns="45720" rtlCol="0"/>
+          <a:bodyPr vert="horz" lIns="83786" tIns="41893" rIns="83786" bIns="41893" rtlCol="0"/>
           <a:lstStyle>
             <a:lvl1pPr algn="r">
-              <a:defRPr sz="1200"/>
+              <a:defRPr sz="1100"/>
             </a:lvl1pPr>
           </a:lstStyle>
           <a:p>
             <a:fld id="{935FE47C-E7B3-4788-B2E7-AACB682ED549}" type="datetimeFigureOut">
               <a:rPr lang="en-GB" smtClean="0"/>
-              <a:t>02/07/2017</a:t>
+              <a:t>04/07/2017</a:t>
             </a:fld>
             <a:endParaRPr lang="en-GB"/>
           </a:p>
@@ -263,8 +267,8 @@
         </p:nvSpPr>
         <p:spPr>
           <a:xfrm>
-            <a:off x="573088" y="1336675"/>
-            <a:ext cx="6413500" cy="3608388"/>
+            <a:off x="422275" y="1241425"/>
+            <a:ext cx="5953125" cy="3349625"/>
           </a:xfrm>
           <a:prstGeom prst="rect">
             <a:avLst/>
@@ -277,7 +281,7 @@
           </a:ln>
         </p:spPr>
         <p:txBody>
-          <a:bodyPr vert="horz" lIns="91440" tIns="45720" rIns="91440" bIns="45720" rtlCol="0" anchor="ctr"/>
+          <a:bodyPr vert="horz" lIns="83786" tIns="41893" rIns="83786" bIns="41893" rtlCol="0" anchor="ctr"/>
           <a:lstStyle/>
           <a:p>
             <a:endParaRPr lang="en-GB"/>
@@ -296,15 +300,15 @@
         </p:nvSpPr>
         <p:spPr>
           <a:xfrm>
-            <a:off x="755650" y="5145088"/>
-            <a:ext cx="6048375" cy="4210050"/>
+            <a:off x="679482" y="4776872"/>
+            <a:ext cx="5438711" cy="3908752"/>
           </a:xfrm>
           <a:prstGeom prst="rect">
             <a:avLst/>
           </a:prstGeom>
         </p:spPr>
         <p:txBody>
-          <a:bodyPr vert="horz" lIns="91440" tIns="45720" rIns="91440" bIns="45720" rtlCol="0"/>
+          <a:bodyPr vert="horz" lIns="83786" tIns="41893" rIns="83786" bIns="41893" rtlCol="0"/>
           <a:lstStyle/>
           <a:p>
             <a:pPr lvl="0"/>
@@ -356,18 +360,18 @@
         </p:nvSpPr>
         <p:spPr>
           <a:xfrm>
-            <a:off x="0" y="10155238"/>
-            <a:ext cx="3276600" cy="536575"/>
+            <a:off x="0" y="9428464"/>
+            <a:ext cx="2946325" cy="498174"/>
           </a:xfrm>
           <a:prstGeom prst="rect">
             <a:avLst/>
           </a:prstGeom>
         </p:spPr>
         <p:txBody>
-          <a:bodyPr vert="horz" lIns="91440" tIns="45720" rIns="91440" bIns="45720" rtlCol="0" anchor="b"/>
+          <a:bodyPr vert="horz" lIns="83786" tIns="41893" rIns="83786" bIns="41893" rtlCol="0" anchor="b"/>
           <a:lstStyle>
             <a:lvl1pPr algn="l">
-              <a:defRPr sz="1200"/>
+              <a:defRPr sz="1100"/>
             </a:lvl1pPr>
           </a:lstStyle>
           <a:p>
@@ -387,18 +391,18 @@
         </p:nvSpPr>
         <p:spPr>
           <a:xfrm>
-            <a:off x="4281488" y="10155238"/>
-            <a:ext cx="3276600" cy="536575"/>
+            <a:off x="3849923" y="9428464"/>
+            <a:ext cx="2946325" cy="498174"/>
           </a:xfrm>
           <a:prstGeom prst="rect">
             <a:avLst/>
           </a:prstGeom>
         </p:spPr>
         <p:txBody>
-          <a:bodyPr vert="horz" lIns="91440" tIns="45720" rIns="91440" bIns="45720" rtlCol="0" anchor="b"/>
+          <a:bodyPr vert="horz" lIns="83786" tIns="41893" rIns="83786" bIns="41893" rtlCol="0" anchor="b"/>
           <a:lstStyle>
             <a:lvl1pPr algn="r">
-              <a:defRPr sz="1200"/>
+              <a:defRPr sz="1100"/>
             </a:lvl1pPr>
           </a:lstStyle>
           <a:p>
@@ -789,7 +793,7 @@
             <a:fld id="{B61BEF0D-F0BB-DE4B-95CE-6DB70DBA9567}" type="datetimeFigureOut">
               <a:rPr lang="en-US" smtClean="0"/>
               <a:pPr/>
-              <a:t>7/2/2017</a:t>
+              <a:t>7/4/2017</a:t>
             </a:fld>
             <a:endParaRPr lang="en-US" dirty="0"/>
           </a:p>
@@ -1227,7 +1231,7 @@
             <a:fld id="{B61BEF0D-F0BB-DE4B-95CE-6DB70DBA9567}" type="datetimeFigureOut">
               <a:rPr lang="en-US" smtClean="0"/>
               <a:pPr/>
-              <a:t>7/2/2017</a:t>
+              <a:t>7/4/2017</a:t>
             </a:fld>
             <a:endParaRPr lang="en-US" dirty="0"/>
           </a:p>
@@ -1479,7 +1483,7 @@
             <a:fld id="{B61BEF0D-F0BB-DE4B-95CE-6DB70DBA9567}" type="datetimeFigureOut">
               <a:rPr lang="en-US" smtClean="0"/>
               <a:pPr/>
-              <a:t>7/2/2017</a:t>
+              <a:t>7/4/2017</a:t>
             </a:fld>
             <a:endParaRPr lang="en-US" dirty="0"/>
           </a:p>
@@ -1789,7 +1793,7 @@
             <a:fld id="{B61BEF0D-F0BB-DE4B-95CE-6DB70DBA9567}" type="datetimeFigureOut">
               <a:rPr lang="en-US" smtClean="0"/>
               <a:pPr/>
-              <a:t>7/2/2017</a:t>
+              <a:t>7/4/2017</a:t>
             </a:fld>
             <a:endParaRPr lang="en-US" dirty="0"/>
           </a:p>
@@ -2109,7 +2113,7 @@
             <a:fld id="{B61BEF0D-F0BB-DE4B-95CE-6DB70DBA9567}" type="datetimeFigureOut">
               <a:rPr lang="en-US" smtClean="0"/>
               <a:pPr/>
-              <a:t>7/2/2017</a:t>
+              <a:t>7/4/2017</a:t>
             </a:fld>
             <a:endParaRPr lang="en-US" dirty="0"/>
           </a:p>
@@ -2413,7 +2417,7 @@
             <a:fld id="{B61BEF0D-F0BB-DE4B-95CE-6DB70DBA9567}" type="datetimeFigureOut">
               <a:rPr lang="en-US" smtClean="0"/>
               <a:pPr/>
-              <a:t>7/2/2017</a:t>
+              <a:t>7/4/2017</a:t>
             </a:fld>
             <a:endParaRPr lang="en-US" dirty="0"/>
           </a:p>
@@ -2782,7 +2786,7 @@
             <a:fld id="{B61BEF0D-F0BB-DE4B-95CE-6DB70DBA9567}" type="datetimeFigureOut">
               <a:rPr lang="en-US" smtClean="0"/>
               <a:pPr/>
-              <a:t>7/2/2017</a:t>
+              <a:t>7/4/2017</a:t>
             </a:fld>
             <a:endParaRPr lang="en-US" dirty="0"/>
           </a:p>
@@ -2958,7 +2962,7 @@
             <a:fld id="{B61BEF0D-F0BB-DE4B-95CE-6DB70DBA9567}" type="datetimeFigureOut">
               <a:rPr lang="en-US" smtClean="0"/>
               <a:pPr/>
-              <a:t>7/2/2017</a:t>
+              <a:t>7/4/2017</a:t>
             </a:fld>
             <a:endParaRPr lang="en-US" dirty="0"/>
           </a:p>
@@ -3140,7 +3144,7 @@
             <a:fld id="{B61BEF0D-F0BB-DE4B-95CE-6DB70DBA9567}" type="datetimeFigureOut">
               <a:rPr lang="en-US" smtClean="0"/>
               <a:pPr/>
-              <a:t>7/2/2017</a:t>
+              <a:t>7/4/2017</a:t>
             </a:fld>
             <a:endParaRPr lang="en-US" dirty="0"/>
           </a:p>
@@ -3312,7 +3316,7 @@
             <a:fld id="{B61BEF0D-F0BB-DE4B-95CE-6DB70DBA9567}" type="datetimeFigureOut">
               <a:rPr lang="en-US" smtClean="0"/>
               <a:pPr/>
-              <a:t>7/2/2017</a:t>
+              <a:t>7/4/2017</a:t>
             </a:fld>
             <a:endParaRPr lang="en-US" dirty="0"/>
           </a:p>
@@ -3564,7 +3568,7 @@
             <a:fld id="{B61BEF0D-F0BB-DE4B-95CE-6DB70DBA9567}" type="datetimeFigureOut">
               <a:rPr lang="en-US" smtClean="0"/>
               <a:pPr/>
-              <a:t>7/2/2017</a:t>
+              <a:t>7/4/2017</a:t>
             </a:fld>
             <a:endParaRPr lang="en-US" dirty="0"/>
           </a:p>
@@ -3802,7 +3806,7 @@
             <a:fld id="{B61BEF0D-F0BB-DE4B-95CE-6DB70DBA9567}" type="datetimeFigureOut">
               <a:rPr lang="en-US" smtClean="0"/>
               <a:pPr/>
-              <a:t>7/2/2017</a:t>
+              <a:t>7/4/2017</a:t>
             </a:fld>
             <a:endParaRPr lang="en-US" dirty="0"/>
           </a:p>
@@ -4186,7 +4190,7 @@
             <a:fld id="{B61BEF0D-F0BB-DE4B-95CE-6DB70DBA9567}" type="datetimeFigureOut">
               <a:rPr lang="en-US" smtClean="0"/>
               <a:pPr/>
-              <a:t>7/2/2017</a:t>
+              <a:t>7/4/2017</a:t>
             </a:fld>
             <a:endParaRPr lang="en-US" dirty="0"/>
           </a:p>
@@ -4306,7 +4310,7 @@
             <a:fld id="{B61BEF0D-F0BB-DE4B-95CE-6DB70DBA9567}" type="datetimeFigureOut">
               <a:rPr lang="en-US" smtClean="0"/>
               <a:pPr/>
-              <a:t>7/2/2017</a:t>
+              <a:t>7/4/2017</a:t>
             </a:fld>
             <a:endParaRPr lang="en-US" dirty="0"/>
           </a:p>
@@ -4403,7 +4407,7 @@
             <a:fld id="{B61BEF0D-F0BB-DE4B-95CE-6DB70DBA9567}" type="datetimeFigureOut">
               <a:rPr lang="en-US" smtClean="0"/>
               <a:pPr/>
-              <a:t>7/2/2017</a:t>
+              <a:t>7/4/2017</a:t>
             </a:fld>
             <a:endParaRPr lang="en-US" dirty="0"/>
           </a:p>
@@ -4660,7 +4664,7 @@
             <a:fld id="{B61BEF0D-F0BB-DE4B-95CE-6DB70DBA9567}" type="datetimeFigureOut">
               <a:rPr lang="en-US" smtClean="0"/>
               <a:pPr/>
-              <a:t>7/2/2017</a:t>
+              <a:t>7/4/2017</a:t>
             </a:fld>
             <a:endParaRPr lang="en-US" dirty="0"/>
           </a:p>
@@ -4945,7 +4949,7 @@
             <a:fld id="{B61BEF0D-F0BB-DE4B-95CE-6DB70DBA9567}" type="datetimeFigureOut">
               <a:rPr lang="en-US" smtClean="0"/>
               <a:pPr/>
-              <a:t>7/2/2017</a:t>
+              <a:t>7/4/2017</a:t>
             </a:fld>
             <a:endParaRPr lang="en-US" dirty="0"/>
           </a:p>
@@ -5353,7 +5357,7 @@
             <a:fld id="{B61BEF0D-F0BB-DE4B-95CE-6DB70DBA9567}" type="datetimeFigureOut">
               <a:rPr lang="en-US" smtClean="0"/>
               <a:pPr/>
-              <a:t>7/2/2017</a:t>
+              <a:t>7/4/2017</a:t>
             </a:fld>
             <a:endParaRPr lang="en-US" dirty="0"/>
           </a:p>
@@ -5898,7 +5902,7 @@
         <p:spPr>
           <a:xfrm>
             <a:off x="0" y="0"/>
-            <a:ext cx="12192000" cy="6858000"/>
+            <a:ext cx="12192000" cy="3602160"/>
           </a:xfrm>
           <a:prstGeom prst="rect">
             <a:avLst/>
@@ -5971,6 +5975,161 @@
           <a:fontRef idx="minor"/>
         </p:style>
       </p:sp>
+      <mc:AlternateContent xmlns:mc="http://schemas.openxmlformats.org/markup-compatibility/2006">
+        <mc:Choice xmlns:a14="http://schemas.microsoft.com/office/drawing/2010/main" Requires="a14">
+          <p:sp>
+            <p:nvSpPr>
+              <p:cNvPr id="4" name="Titolo 19">
+                <a:extLst>
+                  <a:ext uri="{FF2B5EF4-FFF2-40B4-BE49-F238E27FC236}">
+                    <a16:creationId xmlns:a16="http://schemas.microsoft.com/office/drawing/2014/main" id="{0C4A2EA3-0558-4A3E-98BC-FF02512977DE}"/>
+                  </a:ext>
+                </a:extLst>
+              </p:cNvPr>
+              <p:cNvSpPr>
+                <a:spLocks noGrp="1"/>
+              </p:cNvSpPr>
+              <p:nvPr>
+                <p:ph type="title"/>
+              </p:nvPr>
+            </p:nvSpPr>
+            <p:spPr>
+              <a:xfrm>
+                <a:off x="898910" y="2741410"/>
+                <a:ext cx="10394179" cy="3712399"/>
+              </a:xfrm>
+            </p:spPr>
+            <p:txBody>
+              <a:bodyPr/>
+              <a:lstStyle/>
+              <a:p>
+                <a:pPr algn="ctr"/>
+                <a:r>
+                  <a:rPr lang="it-IT" dirty="0">
+                    <a:latin typeface="Arial Rounded MT Bold" panose="020F0704030504030204" pitchFamily="34" charset="0"/>
+                  </a:rPr>
+                  <a:t>Dukaj elvis </a:t>
+                </a:r>
+                <a14:m>
+                  <m:oMath xmlns:m="http://schemas.openxmlformats.org/officeDocument/2006/math">
+                    <m:sSup>
+                      <m:sSupPr>
+                        <m:ctrlPr>
+                          <a:rPr lang="it-IT" b="0" i="1" smtClean="0">
+                            <a:latin typeface="Cambria Math" panose="02040503050406030204" pitchFamily="18" charset="0"/>
+                          </a:rPr>
+                        </m:ctrlPr>
+                      </m:sSupPr>
+                      <m:e>
+                        <m:r>
+                          <a:rPr lang="it-IT" b="0" i="1" smtClean="0">
+                            <a:latin typeface="Cambria Math" panose="02040503050406030204" pitchFamily="18" charset="0"/>
+                          </a:rPr>
+                          <m:t>5</m:t>
+                        </m:r>
+                      </m:e>
+                      <m:sup>
+                        <m:r>
+                          <a:rPr lang="it-IT" b="0" i="1" smtClean="0">
+                            <a:latin typeface="Cambria Math" panose="02040503050406030204" pitchFamily="18" charset="0"/>
+                          </a:rPr>
+                          <m:t>𝑎</m:t>
+                        </m:r>
+                      </m:sup>
+                    </m:sSup>
+                    <m:r>
+                      <a:rPr lang="it-IT" b="0" i="1" smtClean="0">
+                        <a:latin typeface="Cambria Math" panose="02040503050406030204" pitchFamily="18" charset="0"/>
+                      </a:rPr>
+                      <m:t>𝐹</m:t>
+                    </m:r>
+                  </m:oMath>
+                </a14:m>
+                <a:br>
+                  <a:rPr lang="it-IT" b="0" dirty="0">
+                    <a:latin typeface="Arial Rounded MT Bold" panose="020F0704030504030204" pitchFamily="34" charset="0"/>
+                  </a:rPr>
+                </a:br>
+                <a:r>
+                  <a:rPr lang="it-IT" b="0" dirty="0">
+                    <a:latin typeface="Arial Rounded MT Bold" panose="020F0704030504030204" pitchFamily="34" charset="0"/>
+                  </a:rPr>
+                  <a:t>Liceo scientifico – </a:t>
+                </a:r>
+                <a:r>
+                  <a:rPr lang="it-IT" b="0">
+                    <a:latin typeface="Arial Rounded MT Bold" panose="020F0704030504030204" pitchFamily="34" charset="0"/>
+                  </a:rPr>
+                  <a:t>scienze applicate</a:t>
+                </a:r>
+                <a:br>
+                  <a:rPr lang="it-IT" b="0" dirty="0">
+                    <a:latin typeface="Arial Rounded MT Bold" panose="020F0704030504030204" pitchFamily="34" charset="0"/>
+                  </a:rPr>
+                </a:br>
+                <a:r>
+                  <a:rPr lang="it-IT" b="0" dirty="0">
+                    <a:latin typeface="Arial Rounded MT Bold" panose="020F0704030504030204" pitchFamily="34" charset="0"/>
+                  </a:rPr>
+                  <a:t>anno scolastico 2016/</a:t>
+                </a:r>
+                <a:r>
+                  <a:rPr lang="it-IT" dirty="0">
+                    <a:latin typeface="Arial Rounded MT Bold" panose="020F0704030504030204" pitchFamily="34" charset="0"/>
+                  </a:rPr>
+                  <a:t>2017</a:t>
+                </a:r>
+                <a:endParaRPr lang="en-GB" dirty="0">
+                  <a:latin typeface="Arial Rounded MT Bold" panose="020F0704030504030204" pitchFamily="34" charset="0"/>
+                </a:endParaRPr>
+              </a:p>
+            </p:txBody>
+          </p:sp>
+        </mc:Choice>
+        <mc:Fallback>
+          <p:sp>
+            <p:nvSpPr>
+              <p:cNvPr id="4" name="Titolo 19">
+                <a:extLst>
+                  <a:ext uri="{FF2B5EF4-FFF2-40B4-BE49-F238E27FC236}">
+                    <a16:creationId xmlns:a16="http://schemas.microsoft.com/office/drawing/2014/main" id="{0C4A2EA3-0558-4A3E-98BC-FF02512977DE}"/>
+                  </a:ext>
+                </a:extLst>
+              </p:cNvPr>
+              <p:cNvSpPr>
+                <a:spLocks noGrp="1" noRot="1" noChangeAspect="1" noMove="1" noResize="1" noEditPoints="1" noAdjustHandles="1" noChangeArrowheads="1" noChangeShapeType="1" noTextEdit="1"/>
+              </p:cNvSpPr>
+              <p:nvPr>
+                <p:ph type="title"/>
+              </p:nvPr>
+            </p:nvSpPr>
+            <p:spPr>
+              <a:xfrm>
+                <a:off x="898910" y="2741410"/>
+                <a:ext cx="10394179" cy="3712399"/>
+              </a:xfrm>
+              <a:blipFill>
+                <a:blip r:embed="rId2"/>
+                <a:stretch>
+                  <a:fillRect/>
+                </a:stretch>
+              </a:blipFill>
+            </p:spPr>
+            <p:txBody>
+              <a:bodyPr/>
+              <a:lstStyle/>
+              <a:p>
+                <a:r>
+                  <a:rPr lang="it-IT">
+                    <a:noFill/>
+                  </a:rPr>
+                  <a:t> </a:t>
+                </a:r>
+              </a:p>
+            </p:txBody>
+          </p:sp>
+        </mc:Fallback>
+      </mc:AlternateContent>
     </p:spTree>
   </p:cSld>
   <p:clrMapOvr>
@@ -6232,8 +6391,8 @@
           </a:p>
         </p:txBody>
       </p:sp>
-      <mc:AlternateContent xmlns:mc="http://schemas.openxmlformats.org/markup-compatibility/2006">
-        <mc:Choice xmlns:a14="http://schemas.microsoft.com/office/drawing/2010/main" Requires="a14">
+      <mc:AlternateContent xmlns:mc="http://schemas.openxmlformats.org/markup-compatibility/2006" xmlns:a14="http://schemas.microsoft.com/office/drawing/2010/main">
+        <mc:Choice Requires="a14">
           <p:sp>
             <p:nvSpPr>
               <p:cNvPr id="8" name="Segnaposto testo 7">
@@ -7311,7 +7470,7 @@
             </p:txBody>
           </p:sp>
         </mc:Choice>
-        <mc:Fallback>
+        <mc:Fallback xmlns="">
           <p:sp>
             <p:nvSpPr>
               <p:cNvPr id="8" name="Segnaposto testo 7">
@@ -7429,8 +7588,8 @@
           </a:p>
         </p:txBody>
       </p:sp>
-      <mc:AlternateContent xmlns:mc="http://schemas.openxmlformats.org/markup-compatibility/2006">
-        <mc:Choice xmlns:a14="http://schemas.microsoft.com/office/drawing/2010/main" Requires="a14">
+      <mc:AlternateContent xmlns:mc="http://schemas.openxmlformats.org/markup-compatibility/2006" xmlns:a14="http://schemas.microsoft.com/office/drawing/2010/main">
+        <mc:Choice Requires="a14">
           <p:sp>
             <p:nvSpPr>
               <p:cNvPr id="8" name="Segnaposto testo 7">
@@ -8575,7 +8734,7 @@
             </p:txBody>
           </p:sp>
         </mc:Choice>
-        <mc:Fallback>
+        <mc:Fallback xmlns="">
           <p:sp>
             <p:nvSpPr>
               <p:cNvPr id="8" name="Segnaposto testo 7">
@@ -8744,8 +8903,8 @@
           </a:p>
         </p:txBody>
       </p:sp>
-      <mc:AlternateContent xmlns:mc="http://schemas.openxmlformats.org/markup-compatibility/2006">
-        <mc:Choice xmlns:a14="http://schemas.microsoft.com/office/drawing/2010/main" Requires="a14">
+      <mc:AlternateContent xmlns:mc="http://schemas.openxmlformats.org/markup-compatibility/2006" xmlns:a14="http://schemas.microsoft.com/office/drawing/2010/main">
+        <mc:Choice Requires="a14">
           <p:sp>
             <p:nvSpPr>
               <p:cNvPr id="5" name="Segnaposto testo 7">
@@ -9276,7 +9435,7 @@
             </p:txBody>
           </p:sp>
         </mc:Choice>
-        <mc:Fallback>
+        <mc:Fallback xmlns="">
           <p:sp>
             <p:nvSpPr>
               <p:cNvPr id="5" name="Segnaposto testo 7">
@@ -9321,8 +9480,8 @@
           </p:sp>
         </mc:Fallback>
       </mc:AlternateContent>
-      <mc:AlternateContent xmlns:mc="http://schemas.openxmlformats.org/markup-compatibility/2006">
-        <mc:Choice xmlns:a14="http://schemas.microsoft.com/office/drawing/2010/main" Requires="a14">
+      <mc:AlternateContent xmlns:mc="http://schemas.openxmlformats.org/markup-compatibility/2006" xmlns:a14="http://schemas.microsoft.com/office/drawing/2010/main">
+        <mc:Choice Requires="a14">
           <p:sp>
             <p:nvSpPr>
               <p:cNvPr id="6" name="Segnaposto testo 7">
@@ -9821,7 +9980,7 @@
             </p:txBody>
           </p:sp>
         </mc:Choice>
-        <mc:Fallback>
+        <mc:Fallback xmlns="">
           <p:sp>
             <p:nvSpPr>
               <p:cNvPr id="6" name="Segnaposto testo 7">
@@ -11855,8 +12014,8 @@
           </a:prstGeom>
         </p:spPr>
       </p:pic>
-      <mc:AlternateContent xmlns:mc="http://schemas.openxmlformats.org/markup-compatibility/2006">
-        <mc:Choice xmlns:a14="http://schemas.microsoft.com/office/drawing/2010/main" Requires="a14">
+      <mc:AlternateContent xmlns:mc="http://schemas.openxmlformats.org/markup-compatibility/2006" xmlns:a14="http://schemas.microsoft.com/office/drawing/2010/main">
+        <mc:Choice Requires="a14">
           <p:sp>
             <p:nvSpPr>
               <p:cNvPr id="4" name="CasellaDiTesto 3">
@@ -12301,7 +12460,7 @@
             </p:txBody>
           </p:sp>
         </mc:Choice>
-        <mc:Fallback>
+        <mc:Fallback xmlns="">
           <p:sp>
             <p:nvSpPr>
               <p:cNvPr id="4" name="CasellaDiTesto 3">
@@ -12907,7 +13066,7 @@
                 </a:uFill>
                 <a:latin typeface="Arial Rounded MT Bold" panose="020F0704030504030204" pitchFamily="34" charset="0"/>
               </a:rPr>
-              <a:t>Markerless</a:t>
+              <a:t>Marker PROS AND CONS </a:t>
             </a:r>
             <a:endParaRPr lang="en-GB" dirty="0">
               <a:latin typeface="Arial Rounded MT Bold" panose="020F0704030504030204" pitchFamily="34" charset="0"/>
@@ -13503,6 +13662,59 @@
               <a:t> cerca di rilevare le stesse feature a prescindere dalla trasformazione applicata all’immagine.</a:t>
             </a:r>
           </a:p>
+          <a:p>
+            <a:pPr marL="0" indent="0">
+              <a:spcBef>
+                <a:spcPts val="1200"/>
+              </a:spcBef>
+              <a:buNone/>
+            </a:pPr>
+            <a:r>
+              <a:rPr lang="it-IT" sz="2200" dirty="0">
+                <a:solidFill>
+                  <a:schemeClr val="bg1"/>
+                </a:solidFill>
+                <a:latin typeface="Arial Rounded MT Bold" panose="020F0704030504030204" pitchFamily="34" charset="0"/>
+              </a:rPr>
+              <a:t>Ci sono numerosi algoritmi di features-</a:t>
+            </a:r>
+            <a:r>
+              <a:rPr lang="it-IT" sz="2200" dirty="0" err="1">
+                <a:solidFill>
+                  <a:schemeClr val="bg1"/>
+                </a:solidFill>
+                <a:latin typeface="Arial Rounded MT Bold" panose="020F0704030504030204" pitchFamily="34" charset="0"/>
+              </a:rPr>
+              <a:t>detection</a:t>
+            </a:r>
+            <a:r>
+              <a:rPr lang="it-IT" sz="2200" dirty="0">
+                <a:solidFill>
+                  <a:schemeClr val="bg1"/>
+                </a:solidFill>
+                <a:latin typeface="Arial Rounded MT Bold" panose="020F0704030504030204" pitchFamily="34" charset="0"/>
+              </a:rPr>
+              <a:t>, in questa presentazione parlerò del corner-</a:t>
+            </a:r>
+            <a:r>
+              <a:rPr lang="it-IT" sz="2200" dirty="0" err="1">
+                <a:solidFill>
+                  <a:schemeClr val="bg1"/>
+                </a:solidFill>
+                <a:latin typeface="Arial Rounded MT Bold" panose="020F0704030504030204" pitchFamily="34" charset="0"/>
+              </a:rPr>
+              <a:t>detection</a:t>
+            </a:r>
+            <a:r>
+              <a:rPr lang="it-IT" sz="2200" dirty="0">
+                <a:solidFill>
+                  <a:schemeClr val="bg1"/>
+                </a:solidFill>
+                <a:latin typeface="Arial Rounded MT Bold" panose="020F0704030504030204" pitchFamily="34" charset="0"/>
+              </a:rPr>
+              <a:t>, questi algoritmi si basano su una rapida variazione del gradiente dell’immagine.</a:t>
+            </a:r>
+          </a:p>
         </p:txBody>
       </p:sp>
     </p:spTree>
@@ -13631,7 +13843,7 @@
                 </a:solidFill>
                 <a:latin typeface="Arial Rounded MT Bold" panose="020F0704030504030204" pitchFamily="34" charset="0"/>
               </a:rPr>
-              <a:t>Ci sono numerosi algoritmi di features-</a:t>
+              <a:t>Mentre la fase di feature-</a:t>
             </a:r>
             <a:r>
               <a:rPr lang="it-IT" sz="2200" dirty="0" err="1">
@@ -13649,7 +13861,7 @@
                 </a:solidFill>
                 <a:latin typeface="Arial Rounded MT Bold" panose="020F0704030504030204" pitchFamily="34" charset="0"/>
               </a:rPr>
-              <a:t>, in questa presentazione parlerò del corner-</a:t>
+              <a:t> si occupa di trovare le feature, la fase di features-</a:t>
             </a:r>
             <a:r>
               <a:rPr lang="it-IT" sz="2200" dirty="0" err="1">
@@ -13658,7 +13870,7 @@
                 </a:solidFill>
                 <a:latin typeface="Arial Rounded MT Bold" panose="020F0704030504030204" pitchFamily="34" charset="0"/>
               </a:rPr>
-              <a:t>detection</a:t>
+              <a:t>extraction</a:t>
             </a:r>
             <a:r>
               <a:rPr lang="it-IT" sz="2200" dirty="0">
@@ -13667,42 +13879,7 @@
                 </a:solidFill>
                 <a:latin typeface="Arial Rounded MT Bold" panose="020F0704030504030204" pitchFamily="34" charset="0"/>
               </a:rPr>
-              <a:t>. Gli algoritmi di corner-</a:t>
-            </a:r>
-            <a:r>
-              <a:rPr lang="it-IT" sz="2200" dirty="0" err="1">
-                <a:solidFill>
-                  <a:schemeClr val="bg1"/>
-                </a:solidFill>
-                <a:latin typeface="Arial Rounded MT Bold" panose="020F0704030504030204" pitchFamily="34" charset="0"/>
-              </a:rPr>
-              <a:t>detection</a:t>
-            </a:r>
-            <a:r>
-              <a:rPr lang="it-IT" sz="2200" dirty="0">
-                <a:solidFill>
-                  <a:schemeClr val="bg1"/>
-                </a:solidFill>
-                <a:latin typeface="Arial Rounded MT Bold" panose="020F0704030504030204" pitchFamily="34" charset="0"/>
-              </a:rPr>
-              <a:t> si basano su una rapida variazione del gradiente dell’immagine.</a:t>
-            </a:r>
-          </a:p>
-          <a:p>
-            <a:pPr marL="0" indent="0">
-              <a:spcBef>
-                <a:spcPts val="1200"/>
-              </a:spcBef>
-              <a:buNone/>
-            </a:pPr>
-            <a:r>
-              <a:rPr lang="it-IT" sz="2200" dirty="0">
-                <a:solidFill>
-                  <a:schemeClr val="bg1"/>
-                </a:solidFill>
-                <a:latin typeface="Arial Rounded MT Bold" panose="020F0704030504030204" pitchFamily="34" charset="0"/>
-              </a:rPr>
-              <a:t>L’orientamento dei punti è dato dalla direzione del gradiente. In questo modo a prescindere dall’orientamento dell’immagine il feature-point non cambia.</a:t>
+              <a:t> si occupa di rappresentare i punti interessanti, qual è l’orientamento locale dell’area attorno al punto?</a:t>
             </a:r>
           </a:p>
           <a:p>

</xml_diff>